<commit_message>
Direcional entre Empresa-AreaInteresse, Empresa-Profissao, Empresa-Maturidade
</commit_message>
<xml_diff>
--- a/4.UI/Icons CRM v1.pptx
+++ b/4.UI/Icons CRM v1.pptx
@@ -5,7 +5,7 @@
     <p:sldMasterId id="2147483648" r:id="rId1"/>
   </p:sldMasterIdLst>
   <p:notesMasterIdLst>
-    <p:notesMasterId r:id="rId28"/>
+    <p:notesMasterId r:id="rId31"/>
   </p:notesMasterIdLst>
   <p:sldIdLst>
     <p:sldId id="308" r:id="rId2"/>
@@ -19,21 +19,24 @@
     <p:sldId id="319" r:id="rId10"/>
     <p:sldId id="316" r:id="rId11"/>
     <p:sldId id="315" r:id="rId12"/>
-    <p:sldId id="310" r:id="rId13"/>
-    <p:sldId id="312" r:id="rId14"/>
-    <p:sldId id="293" r:id="rId15"/>
-    <p:sldId id="304" r:id="rId16"/>
-    <p:sldId id="305" r:id="rId17"/>
-    <p:sldId id="289" r:id="rId18"/>
-    <p:sldId id="300" r:id="rId19"/>
-    <p:sldId id="292" r:id="rId20"/>
-    <p:sldId id="295" r:id="rId21"/>
-    <p:sldId id="302" r:id="rId22"/>
-    <p:sldId id="301" r:id="rId23"/>
-    <p:sldId id="303" r:id="rId24"/>
-    <p:sldId id="297" r:id="rId25"/>
-    <p:sldId id="298" r:id="rId26"/>
-    <p:sldId id="299" r:id="rId27"/>
+    <p:sldId id="322" r:id="rId13"/>
+    <p:sldId id="323" r:id="rId14"/>
+    <p:sldId id="310" r:id="rId15"/>
+    <p:sldId id="312" r:id="rId16"/>
+    <p:sldId id="293" r:id="rId17"/>
+    <p:sldId id="304" r:id="rId18"/>
+    <p:sldId id="305" r:id="rId19"/>
+    <p:sldId id="289" r:id="rId20"/>
+    <p:sldId id="300" r:id="rId21"/>
+    <p:sldId id="292" r:id="rId22"/>
+    <p:sldId id="295" r:id="rId23"/>
+    <p:sldId id="302" r:id="rId24"/>
+    <p:sldId id="301" r:id="rId25"/>
+    <p:sldId id="303" r:id="rId26"/>
+    <p:sldId id="297" r:id="rId27"/>
+    <p:sldId id="321" r:id="rId28"/>
+    <p:sldId id="298" r:id="rId29"/>
+    <p:sldId id="299" r:id="rId30"/>
   </p:sldIdLst>
   <p:sldSz cx="10799763" cy="10799763"/>
   <p:notesSz cx="9144000" cy="6858000"/>
@@ -148,6 +151,8 @@
             <p14:sldId id="319"/>
             <p14:sldId id="316"/>
             <p14:sldId id="315"/>
+            <p14:sldId id="322"/>
+            <p14:sldId id="323"/>
             <p14:sldId id="310"/>
             <p14:sldId id="312"/>
             <p14:sldId id="293"/>
@@ -165,6 +170,7 @@
         <p14:section name="Seção sem Título" id="{121C1EAC-8AFD-47BF-8A70-D9928B803CFB}">
           <p14:sldIdLst>
             <p14:sldId id="297"/>
+            <p14:sldId id="321"/>
             <p14:sldId id="298"/>
           </p14:sldIdLst>
         </p14:section>
@@ -278,7 +284,7 @@
           <a:p>
             <a:fld id="{9F743EC8-76CF-4E7F-BAC7-304746B76D72}" type="datetimeFigureOut">
               <a:rPr lang="pt-BR" smtClean="0"/>
-              <a:t>19/05/2016</a:t>
+              <a:t>27/05/2016</a:t>
             </a:fld>
             <a:endParaRPr lang="pt-BR"/>
           </a:p>
@@ -728,7 +734,7 @@
             <a:fld id="{1B45BA29-84C7-4EAB-A065-0CAC1B85748C}" type="datetimeFigureOut">
               <a:rPr lang="pt-BR" smtClean="0"/>
               <a:pPr/>
-              <a:t>19/05/2016</a:t>
+              <a:t>27/05/2016</a:t>
             </a:fld>
             <a:endParaRPr lang="pt-BR"/>
           </a:p>
@@ -895,7 +901,7 @@
             <a:fld id="{1B45BA29-84C7-4EAB-A065-0CAC1B85748C}" type="datetimeFigureOut">
               <a:rPr lang="pt-BR" smtClean="0"/>
               <a:pPr/>
-              <a:t>19/05/2016</a:t>
+              <a:t>27/05/2016</a:t>
             </a:fld>
             <a:endParaRPr lang="pt-BR"/>
           </a:p>
@@ -1072,7 +1078,7 @@
             <a:fld id="{1B45BA29-84C7-4EAB-A065-0CAC1B85748C}" type="datetimeFigureOut">
               <a:rPr lang="pt-BR" smtClean="0"/>
               <a:pPr/>
-              <a:t>19/05/2016</a:t>
+              <a:t>27/05/2016</a:t>
             </a:fld>
             <a:endParaRPr lang="pt-BR"/>
           </a:p>
@@ -1239,7 +1245,7 @@
             <a:fld id="{1B45BA29-84C7-4EAB-A065-0CAC1B85748C}" type="datetimeFigureOut">
               <a:rPr lang="pt-BR" smtClean="0"/>
               <a:pPr/>
-              <a:t>19/05/2016</a:t>
+              <a:t>27/05/2016</a:t>
             </a:fld>
             <a:endParaRPr lang="pt-BR"/>
           </a:p>
@@ -1482,7 +1488,7 @@
             <a:fld id="{1B45BA29-84C7-4EAB-A065-0CAC1B85748C}" type="datetimeFigureOut">
               <a:rPr lang="pt-BR" smtClean="0"/>
               <a:pPr/>
-              <a:t>19/05/2016</a:t>
+              <a:t>27/05/2016</a:t>
             </a:fld>
             <a:endParaRPr lang="pt-BR"/>
           </a:p>
@@ -1767,7 +1773,7 @@
             <a:fld id="{1B45BA29-84C7-4EAB-A065-0CAC1B85748C}" type="datetimeFigureOut">
               <a:rPr lang="pt-BR" smtClean="0"/>
               <a:pPr/>
-              <a:t>19/05/2016</a:t>
+              <a:t>27/05/2016</a:t>
             </a:fld>
             <a:endParaRPr lang="pt-BR"/>
           </a:p>
@@ -2186,7 +2192,7 @@
             <a:fld id="{1B45BA29-84C7-4EAB-A065-0CAC1B85748C}" type="datetimeFigureOut">
               <a:rPr lang="pt-BR" smtClean="0"/>
               <a:pPr/>
-              <a:t>19/05/2016</a:t>
+              <a:t>27/05/2016</a:t>
             </a:fld>
             <a:endParaRPr lang="pt-BR"/>
           </a:p>
@@ -2301,7 +2307,7 @@
             <a:fld id="{1B45BA29-84C7-4EAB-A065-0CAC1B85748C}" type="datetimeFigureOut">
               <a:rPr lang="pt-BR" smtClean="0"/>
               <a:pPr/>
-              <a:t>19/05/2016</a:t>
+              <a:t>27/05/2016</a:t>
             </a:fld>
             <a:endParaRPr lang="pt-BR"/>
           </a:p>
@@ -2393,7 +2399,7 @@
             <a:fld id="{1B45BA29-84C7-4EAB-A065-0CAC1B85748C}" type="datetimeFigureOut">
               <a:rPr lang="pt-BR" smtClean="0"/>
               <a:pPr/>
-              <a:t>19/05/2016</a:t>
+              <a:t>27/05/2016</a:t>
             </a:fld>
             <a:endParaRPr lang="pt-BR"/>
           </a:p>
@@ -2667,7 +2673,7 @@
             <a:fld id="{1B45BA29-84C7-4EAB-A065-0CAC1B85748C}" type="datetimeFigureOut">
               <a:rPr lang="pt-BR" smtClean="0"/>
               <a:pPr/>
-              <a:t>19/05/2016</a:t>
+              <a:t>27/05/2016</a:t>
             </a:fld>
             <a:endParaRPr lang="pt-BR"/>
           </a:p>
@@ -2917,7 +2923,7 @@
             <a:fld id="{1B45BA29-84C7-4EAB-A065-0CAC1B85748C}" type="datetimeFigureOut">
               <a:rPr lang="pt-BR" smtClean="0"/>
               <a:pPr/>
-              <a:t>19/05/2016</a:t>
+              <a:t>27/05/2016</a:t>
             </a:fld>
             <a:endParaRPr lang="pt-BR"/>
           </a:p>
@@ -3127,7 +3133,7 @@
             <a:fld id="{1B45BA29-84C7-4EAB-A065-0CAC1B85748C}" type="datetimeFigureOut">
               <a:rPr lang="pt-BR" smtClean="0"/>
               <a:pPr/>
-              <a:t>19/05/2016</a:t>
+              <a:t>27/05/2016</a:t>
             </a:fld>
             <a:endParaRPr lang="pt-BR"/>
           </a:p>
@@ -4781,19 +4787,19 @@
           <a:gradFill flip="none" rotWithShape="1">
             <a:gsLst>
               <a:gs pos="0">
-                <a:srgbClr val="CC0066">
+                <a:srgbClr val="0070C0">
                   <a:shade val="30000"/>
                   <a:satMod val="115000"/>
                 </a:srgbClr>
               </a:gs>
               <a:gs pos="50000">
-                <a:srgbClr val="CC0066">
+                <a:srgbClr val="0070C0">
                   <a:shade val="67500"/>
                   <a:satMod val="115000"/>
                 </a:srgbClr>
               </a:gs>
               <a:gs pos="100000">
-                <a:srgbClr val="CC0066">
+                <a:srgbClr val="0070C0">
                   <a:shade val="100000"/>
                   <a:satMod val="115000"/>
                 </a:srgbClr>
@@ -4829,9 +4835,30 @@
           <a:p>
             <a:pPr algn="ctr"/>
             <a:endParaRPr lang="pt-BR" dirty="0">
-              <a:solidFill>
-                <a:prstClr val="white"/>
-              </a:solidFill>
+              <a:gradFill flip="none" rotWithShape="1">
+                <a:gsLst>
+                  <a:gs pos="0">
+                    <a:prstClr val="white">
+                      <a:shade val="30000"/>
+                      <a:satMod val="115000"/>
+                    </a:prstClr>
+                  </a:gs>
+                  <a:gs pos="50000">
+                    <a:prstClr val="white">
+                      <a:shade val="67500"/>
+                      <a:satMod val="115000"/>
+                    </a:prstClr>
+                  </a:gs>
+                  <a:gs pos="100000">
+                    <a:prstClr val="white">
+                      <a:shade val="100000"/>
+                      <a:satMod val="115000"/>
+                    </a:prstClr>
+                  </a:gs>
+                </a:gsLst>
+                <a:lin ang="16200000" scaled="1"/>
+                <a:tileRect/>
+              </a:gradFill>
             </a:endParaRPr>
           </a:p>
         </p:txBody>
@@ -4879,15 +4906,15 @@
             <a:r>
               <a:rPr lang="pt-BR" sz="12000" b="1" dirty="0" smtClean="0">
                 <a:solidFill>
-                  <a:srgbClr val="CC0066"/>
+                  <a:schemeClr val="tx2"/>
                 </a:solidFill>
                 <a:latin typeface="Candara" pitchFamily="34" charset="0"/>
               </a:rPr>
-              <a:t>Pessoas</a:t>
+              <a:t>Produto</a:t>
             </a:r>
             <a:endParaRPr lang="pt-BR" sz="12000" b="1" dirty="0">
               <a:solidFill>
-                <a:srgbClr val="CC0066"/>
+                <a:schemeClr val="tx2"/>
               </a:solidFill>
               <a:latin typeface="Candara" pitchFamily="34" charset="0"/>
             </a:endParaRPr>
@@ -4896,16 +4923,16 @@
       </p:sp>
       <p:sp>
         <p:nvSpPr>
-          <p:cNvPr id="5" name="Elipse 4"/>
+          <p:cNvPr id="17" name="Losango 16"/>
           <p:cNvSpPr/>
           <p:nvPr/>
         </p:nvSpPr>
         <p:spPr>
-          <a:xfrm>
-            <a:off x="3599881" y="1102798"/>
-            <a:ext cx="3600000" cy="3600000"/>
-          </a:xfrm>
-          <a:prstGeom prst="ellipse">
+          <a:xfrm rot="-1800000">
+            <a:off x="2832784" y="2356120"/>
+            <a:ext cx="2520000" cy="4320000"/>
+          </a:xfrm>
+          <a:prstGeom prst="diamond">
             <a:avLst/>
           </a:prstGeom>
           <a:solidFill>
@@ -4944,20 +4971,17 @@
       </p:sp>
       <p:sp>
         <p:nvSpPr>
-          <p:cNvPr id="6" name="Pizza 5"/>
+          <p:cNvPr id="19" name="Losango 18"/>
           <p:cNvSpPr/>
           <p:nvPr/>
         </p:nvSpPr>
         <p:spPr>
-          <a:xfrm>
-            <a:off x="1799881" y="4535785"/>
-            <a:ext cx="7200000" cy="5400000"/>
-          </a:xfrm>
-          <a:prstGeom prst="pie">
-            <a:avLst>
-              <a:gd name="adj1" fmla="val 10811423"/>
-              <a:gd name="adj2" fmla="val 21566014"/>
-            </a:avLst>
+          <a:xfrm rot="16200000">
+            <a:off x="4139881" y="201212"/>
+            <a:ext cx="2520000" cy="4320000"/>
+          </a:xfrm>
+          <a:prstGeom prst="diamond">
+            <a:avLst/>
           </a:prstGeom>
           <a:solidFill>
             <a:schemeClr val="bg1"/>
@@ -4989,18 +5013,62 @@
           <a:lstStyle/>
           <a:p>
             <a:pPr algn="ctr"/>
-            <a:endParaRPr lang="pt-BR">
-              <a:solidFill>
-                <a:schemeClr val="tx1"/>
-              </a:solidFill>
-            </a:endParaRPr>
+            <a:endParaRPr lang="pt-BR"/>
+          </a:p>
+        </p:txBody>
+      </p:sp>
+      <p:sp>
+        <p:nvSpPr>
+          <p:cNvPr id="20" name="Losango 19"/>
+          <p:cNvSpPr/>
+          <p:nvPr/>
+        </p:nvSpPr>
+        <p:spPr>
+          <a:xfrm rot="1800000" flipH="1">
+            <a:off x="5302962" y="2428128"/>
+            <a:ext cx="2520000" cy="4320000"/>
+          </a:xfrm>
+          <a:prstGeom prst="diamond">
+            <a:avLst/>
+          </a:prstGeom>
+          <a:solidFill>
+            <a:schemeClr val="bg1"/>
+          </a:solidFill>
+          <a:ln w="76200">
+            <a:solidFill>
+              <a:schemeClr val="bg1"/>
+            </a:solidFill>
+          </a:ln>
+        </p:spPr>
+        <p:style>
+          <a:lnRef idx="2">
+            <a:schemeClr val="accent1">
+              <a:shade val="50000"/>
+            </a:schemeClr>
+          </a:lnRef>
+          <a:fillRef idx="1">
+            <a:schemeClr val="accent1"/>
+          </a:fillRef>
+          <a:effectRef idx="0">
+            <a:schemeClr val="accent1"/>
+          </a:effectRef>
+          <a:fontRef idx="minor">
+            <a:schemeClr val="lt1"/>
+          </a:fontRef>
+        </p:style>
+        <p:txBody>
+          <a:bodyPr rtlCol="0" anchor="ctr"/>
+          <a:lstStyle/>
+          <a:p>
+            <a:pPr algn="ctr"/>
+            <a:endParaRPr lang="pt-BR"/>
           </a:p>
         </p:txBody>
       </p:sp>
     </p:spTree>
     <p:extLst>
       <p:ext uri="{BB962C8B-B14F-4D97-AF65-F5344CB8AC3E}">
-        <p14:creationId xmlns:p14="http://schemas.microsoft.com/office/powerpoint/2010/main" val="3543225107"/>
+        <p14:creationId xmlns:p14="http://schemas.microsoft.com/office/powerpoint/2010/main" val="3504136766"/>
       </p:ext>
     </p:extLst>
   </p:cSld>
@@ -5053,19 +5121,19 @@
           <a:gradFill flip="none" rotWithShape="1">
             <a:gsLst>
               <a:gs pos="0">
-                <a:srgbClr val="CC0066">
+                <a:srgbClr val="0070C0">
                   <a:shade val="30000"/>
                   <a:satMod val="115000"/>
                 </a:srgbClr>
               </a:gs>
               <a:gs pos="50000">
-                <a:srgbClr val="CC0066">
+                <a:srgbClr val="0070C0">
                   <a:shade val="67500"/>
                   <a:satMod val="115000"/>
                 </a:srgbClr>
               </a:gs>
               <a:gs pos="100000">
-                <a:srgbClr val="CC0066">
+                <a:srgbClr val="0070C0">
                   <a:shade val="100000"/>
                   <a:satMod val="115000"/>
                 </a:srgbClr>
@@ -5101,9 +5169,30 @@
           <a:p>
             <a:pPr algn="ctr"/>
             <a:endParaRPr lang="pt-BR" dirty="0">
-              <a:solidFill>
-                <a:prstClr val="white"/>
-              </a:solidFill>
+              <a:gradFill flip="none" rotWithShape="1">
+                <a:gsLst>
+                  <a:gs pos="0">
+                    <a:prstClr val="white">
+                      <a:shade val="30000"/>
+                      <a:satMod val="115000"/>
+                    </a:prstClr>
+                  </a:gs>
+                  <a:gs pos="50000">
+                    <a:prstClr val="white">
+                      <a:shade val="67500"/>
+                      <a:satMod val="115000"/>
+                    </a:prstClr>
+                  </a:gs>
+                  <a:gs pos="100000">
+                    <a:prstClr val="white">
+                      <a:shade val="100000"/>
+                      <a:satMod val="115000"/>
+                    </a:prstClr>
+                  </a:gs>
+                </a:gsLst>
+                <a:lin ang="16200000" scaled="1"/>
+                <a:tileRect/>
+              </a:gradFill>
             </a:endParaRPr>
           </a:p>
         </p:txBody>
@@ -5151,55 +5240,75 @@
             <a:r>
               <a:rPr lang="pt-BR" sz="12000" b="1" dirty="0" smtClean="0">
                 <a:solidFill>
-                  <a:srgbClr val="CC0066"/>
+                  <a:schemeClr val="tx2"/>
                 </a:solidFill>
                 <a:latin typeface="Candara" pitchFamily="34" charset="0"/>
               </a:rPr>
-              <a:t>Pessoas</a:t>
+              <a:t>Produto</a:t>
             </a:r>
             <a:endParaRPr lang="pt-BR" sz="12000" b="1" dirty="0">
               <a:solidFill>
-                <a:srgbClr val="CC0066"/>
+                <a:schemeClr val="tx2"/>
               </a:solidFill>
               <a:latin typeface="Candara" pitchFamily="34" charset="0"/>
             </a:endParaRPr>
           </a:p>
         </p:txBody>
       </p:sp>
-      <p:pic>
-        <p:nvPicPr>
-          <p:cNvPr id="6" name="Imagem 5"/>
-          <p:cNvPicPr>
-            <a:picLocks noChangeAspect="1"/>
-          </p:cNvPicPr>
-          <p:nvPr/>
-        </p:nvPicPr>
-        <p:blipFill>
-          <a:blip r:embed="rId2" cstate="print">
-            <a:extLst>
-              <a:ext uri="{28A0092B-C50C-407E-A947-70E740481C1C}">
-                <a14:useLocalDpi xmlns:a14="http://schemas.microsoft.com/office/drawing/2010/main" val="0"/>
-              </a:ext>
-            </a:extLst>
-          </a:blip>
-          <a:stretch>
-            <a:fillRect/>
-          </a:stretch>
-        </p:blipFill>
-        <p:spPr>
-          <a:xfrm>
-            <a:off x="1439881" y="791369"/>
-            <a:ext cx="7920000" cy="7920000"/>
-          </a:xfrm>
-          <a:prstGeom prst="rect">
-            <a:avLst/>
-          </a:prstGeom>
-        </p:spPr>
-      </p:pic>
+      <p:sp>
+        <p:nvSpPr>
+          <p:cNvPr id="2" name="Cubo 1"/>
+          <p:cNvSpPr/>
+          <p:nvPr/>
+        </p:nvSpPr>
+        <p:spPr>
+          <a:xfrm>
+            <a:off x="3167633" y="2015505"/>
+            <a:ext cx="3600400" cy="3600400"/>
+          </a:xfrm>
+          <a:prstGeom prst="cube">
+            <a:avLst>
+              <a:gd name="adj" fmla="val 33744"/>
+            </a:avLst>
+          </a:prstGeom>
+          <a:solidFill>
+            <a:schemeClr val="bg1"/>
+          </a:solidFill>
+          <a:ln w="76200">
+            <a:solidFill>
+              <a:schemeClr val="tx2"/>
+            </a:solidFill>
+          </a:ln>
+        </p:spPr>
+        <p:style>
+          <a:lnRef idx="2">
+            <a:schemeClr val="accent1">
+              <a:shade val="50000"/>
+            </a:schemeClr>
+          </a:lnRef>
+          <a:fillRef idx="1">
+            <a:schemeClr val="accent1"/>
+          </a:fillRef>
+          <a:effectRef idx="0">
+            <a:schemeClr val="accent1"/>
+          </a:effectRef>
+          <a:fontRef idx="minor">
+            <a:schemeClr val="lt1"/>
+          </a:fontRef>
+        </p:style>
+        <p:txBody>
+          <a:bodyPr rtlCol="0" anchor="ctr"/>
+          <a:lstStyle/>
+          <a:p>
+            <a:pPr algn="ctr"/>
+            <a:endParaRPr lang="pt-BR"/>
+          </a:p>
+        </p:txBody>
+      </p:sp>
     </p:spTree>
     <p:extLst>
       <p:ext uri="{BB962C8B-B14F-4D97-AF65-F5344CB8AC3E}">
-        <p14:creationId xmlns:p14="http://schemas.microsoft.com/office/powerpoint/2010/main" val="833281821"/>
+        <p14:creationId xmlns:p14="http://schemas.microsoft.com/office/powerpoint/2010/main" val="480077659"/>
       </p:ext>
     </p:extLst>
   </p:cSld>
@@ -5242,35 +5351,32 @@
         <p:spPr>
           <a:xfrm>
             <a:off x="179881" y="179881"/>
-            <a:ext cx="10440000" cy="10440000"/>
+            <a:ext cx="10440000" cy="9000000"/>
           </a:xfrm>
           <a:prstGeom prst="roundRect">
             <a:avLst>
-              <a:gd name="adj" fmla="val 0"/>
+              <a:gd name="adj" fmla="val 14844"/>
             </a:avLst>
           </a:prstGeom>
           <a:gradFill flip="none" rotWithShape="1">
             <a:gsLst>
               <a:gs pos="0">
-                <a:schemeClr val="accent6">
-                  <a:lumMod val="75000"/>
+                <a:srgbClr val="CC0066">
                   <a:shade val="30000"/>
                   <a:satMod val="115000"/>
-                </a:schemeClr>
+                </a:srgbClr>
               </a:gs>
               <a:gs pos="50000">
-                <a:schemeClr val="accent6">
-                  <a:lumMod val="75000"/>
+                <a:srgbClr val="CC0066">
                   <a:shade val="67500"/>
                   <a:satMod val="115000"/>
-                </a:schemeClr>
+                </a:srgbClr>
               </a:gs>
               <a:gs pos="100000">
-                <a:schemeClr val="accent6">
-                  <a:lumMod val="75000"/>
+                <a:srgbClr val="CC0066">
                   <a:shade val="100000"/>
                   <a:satMod val="115000"/>
-                </a:schemeClr>
+                </a:srgbClr>
               </a:gs>
             </a:gsLst>
             <a:lin ang="16200000" scaled="1"/>
@@ -5302,22 +5408,84 @@
           <a:lstStyle/>
           <a:p>
             <a:pPr algn="ctr"/>
-            <a:endParaRPr lang="pt-BR"/>
-          </a:p>
-        </p:txBody>
-      </p:sp>
-      <p:sp>
-        <p:nvSpPr>
-          <p:cNvPr id="15" name="Retângulo de cantos arredondados 14"/>
+            <a:endParaRPr lang="pt-BR" dirty="0">
+              <a:solidFill>
+                <a:prstClr val="white"/>
+              </a:solidFill>
+            </a:endParaRPr>
+          </a:p>
+        </p:txBody>
+      </p:sp>
+      <p:sp>
+        <p:nvSpPr>
+          <p:cNvPr id="13" name="Retângulo 12"/>
           <p:cNvSpPr/>
           <p:nvPr/>
         </p:nvSpPr>
         <p:spPr>
           <a:xfrm>
-            <a:off x="7128193" y="4319761"/>
-            <a:ext cx="1080000" cy="1800000"/>
-          </a:xfrm>
-          <a:prstGeom prst="roundRect">
+            <a:off x="179881" y="9180481"/>
+            <a:ext cx="10440000" cy="1620000"/>
+          </a:xfrm>
+          <a:prstGeom prst="rect">
+            <a:avLst/>
+          </a:prstGeom>
+          <a:noFill/>
+          <a:ln w="76200">
+            <a:noFill/>
+          </a:ln>
+        </p:spPr>
+        <p:style>
+          <a:lnRef idx="2">
+            <a:schemeClr val="accent1">
+              <a:shade val="50000"/>
+            </a:schemeClr>
+          </a:lnRef>
+          <a:fillRef idx="1">
+            <a:schemeClr val="accent1"/>
+          </a:fillRef>
+          <a:effectRef idx="0">
+            <a:schemeClr val="accent1"/>
+          </a:effectRef>
+          <a:fontRef idx="minor">
+            <a:schemeClr val="lt1"/>
+          </a:fontRef>
+        </p:style>
+        <p:txBody>
+          <a:bodyPr rtlCol="0" anchor="ctr"/>
+          <a:lstStyle/>
+          <a:p>
+            <a:pPr algn="ctr"/>
+            <a:r>
+              <a:rPr lang="pt-BR" sz="12000" b="1" dirty="0" smtClean="0">
+                <a:solidFill>
+                  <a:srgbClr val="CC0066"/>
+                </a:solidFill>
+                <a:latin typeface="Candara" pitchFamily="34" charset="0"/>
+              </a:rPr>
+              <a:t>Pessoas</a:t>
+            </a:r>
+            <a:endParaRPr lang="pt-BR" sz="12000" b="1" dirty="0">
+              <a:solidFill>
+                <a:srgbClr val="CC0066"/>
+              </a:solidFill>
+              <a:latin typeface="Candara" pitchFamily="34" charset="0"/>
+            </a:endParaRPr>
+          </a:p>
+        </p:txBody>
+      </p:sp>
+      <p:sp>
+        <p:nvSpPr>
+          <p:cNvPr id="5" name="Elipse 4"/>
+          <p:cNvSpPr/>
+          <p:nvPr/>
+        </p:nvSpPr>
+        <p:spPr>
+          <a:xfrm>
+            <a:off x="3599881" y="1102798"/>
+            <a:ext cx="3600000" cy="3600000"/>
+          </a:xfrm>
+          <a:prstGeom prst="ellipse">
             <a:avLst/>
           </a:prstGeom>
           <a:solidFill>
@@ -5356,17 +5524,20 @@
       </p:sp>
       <p:sp>
         <p:nvSpPr>
-          <p:cNvPr id="16" name="Retângulo de cantos arredondados 15"/>
+          <p:cNvPr id="6" name="Pizza 5"/>
           <p:cNvSpPr/>
           <p:nvPr/>
         </p:nvSpPr>
         <p:spPr>
           <a:xfrm>
-            <a:off x="2591689" y="4292965"/>
-            <a:ext cx="1080000" cy="1800000"/>
-          </a:xfrm>
-          <a:prstGeom prst="roundRect">
-            <a:avLst/>
+            <a:off x="1799881" y="4535785"/>
+            <a:ext cx="7200000" cy="5400000"/>
+          </a:xfrm>
+          <a:prstGeom prst="pie">
+            <a:avLst>
+              <a:gd name="adj1" fmla="val 10811423"/>
+              <a:gd name="adj2" fmla="val 21566014"/>
+            </a:avLst>
           </a:prstGeom>
           <a:solidFill>
             <a:schemeClr val="bg1"/>
@@ -5398,190 +5569,18 @@
           <a:lstStyle/>
           <a:p>
             <a:pPr algn="ctr"/>
-            <a:endParaRPr lang="pt-BR"/>
-          </a:p>
-        </p:txBody>
-      </p:sp>
-      <p:cxnSp>
-        <p:nvCxnSpPr>
-          <p:cNvPr id="17" name="Conector em curva 16"/>
-          <p:cNvCxnSpPr>
-            <a:stCxn id="16" idx="0"/>
-            <a:endCxn id="15" idx="0"/>
-          </p:cNvCxnSpPr>
-          <p:nvPr/>
-        </p:nvCxnSpPr>
-        <p:spPr>
-          <a:xfrm rot="16200000" flipH="1">
-            <a:off x="5386543" y="2038111"/>
-            <a:ext cx="26796" cy="4536504"/>
-          </a:xfrm>
-          <a:prstGeom prst="curvedConnector3">
-            <a:avLst>
-              <a:gd name="adj1" fmla="val -7286420"/>
-            </a:avLst>
-          </a:prstGeom>
-          <a:ln w="254000">
-            <a:solidFill>
-              <a:schemeClr val="bg1"/>
-            </a:solidFill>
-          </a:ln>
-        </p:spPr>
-        <p:style>
-          <a:lnRef idx="1">
-            <a:schemeClr val="accent1"/>
-          </a:lnRef>
-          <a:fillRef idx="0">
-            <a:schemeClr val="accent1"/>
-          </a:fillRef>
-          <a:effectRef idx="0">
-            <a:schemeClr val="accent1"/>
-          </a:effectRef>
-          <a:fontRef idx="minor">
-            <a:schemeClr val="tx1"/>
-          </a:fontRef>
-        </p:style>
-      </p:cxnSp>
-      <p:sp>
-        <p:nvSpPr>
-          <p:cNvPr id="18" name="Elipse 17"/>
-          <p:cNvSpPr/>
-          <p:nvPr/>
-        </p:nvSpPr>
-        <p:spPr>
-          <a:xfrm>
-            <a:off x="5795985" y="6876105"/>
-            <a:ext cx="540000" cy="540000"/>
-          </a:xfrm>
-          <a:prstGeom prst="ellipse">
-            <a:avLst/>
-          </a:prstGeom>
-          <a:solidFill>
-            <a:schemeClr val="bg1"/>
-          </a:solidFill>
-          <a:ln w="76200">
-            <a:solidFill>
-              <a:schemeClr val="bg1"/>
-            </a:solidFill>
-          </a:ln>
-        </p:spPr>
-        <p:style>
-          <a:lnRef idx="2">
-            <a:schemeClr val="accent1">
-              <a:shade val="50000"/>
-            </a:schemeClr>
-          </a:lnRef>
-          <a:fillRef idx="1">
-            <a:schemeClr val="accent1"/>
-          </a:fillRef>
-          <a:effectRef idx="0">
-            <a:schemeClr val="accent1"/>
-          </a:effectRef>
-          <a:fontRef idx="minor">
-            <a:schemeClr val="lt1"/>
-          </a:fontRef>
-        </p:style>
-        <p:txBody>
-          <a:bodyPr rtlCol="0" anchor="ctr"/>
-          <a:lstStyle/>
-          <a:p>
-            <a:pPr algn="ctr"/>
-            <a:endParaRPr lang="pt-BR"/>
-          </a:p>
-        </p:txBody>
-      </p:sp>
-      <p:cxnSp>
-        <p:nvCxnSpPr>
-          <p:cNvPr id="19" name="Conector em curva 18"/>
-          <p:cNvCxnSpPr>
-            <a:stCxn id="15" idx="2"/>
-            <a:endCxn id="18" idx="6"/>
-          </p:cNvCxnSpPr>
-          <p:nvPr/>
-        </p:nvCxnSpPr>
-        <p:spPr>
-          <a:xfrm rot="5400000">
-            <a:off x="6488917" y="5966829"/>
-            <a:ext cx="1026344" cy="1332208"/>
-          </a:xfrm>
-          <a:prstGeom prst="curvedConnector2">
-            <a:avLst/>
-          </a:prstGeom>
-          <a:ln w="127000">
-            <a:solidFill>
-              <a:schemeClr val="bg1"/>
-            </a:solidFill>
-          </a:ln>
-        </p:spPr>
-        <p:style>
-          <a:lnRef idx="1">
-            <a:schemeClr val="accent1"/>
-          </a:lnRef>
-          <a:fillRef idx="0">
-            <a:schemeClr val="accent1"/>
-          </a:fillRef>
-          <a:effectRef idx="0">
-            <a:schemeClr val="accent1"/>
-          </a:effectRef>
-          <a:fontRef idx="minor">
-            <a:schemeClr val="tx1"/>
-          </a:fontRef>
-        </p:style>
-      </p:cxnSp>
-      <p:sp>
-        <p:nvSpPr>
-          <p:cNvPr id="5" name="Cruz 4"/>
-          <p:cNvSpPr/>
-          <p:nvPr/>
-        </p:nvSpPr>
-        <p:spPr>
-          <a:xfrm>
-            <a:off x="935385" y="7416105"/>
-            <a:ext cx="2520000" cy="2520000"/>
-          </a:xfrm>
-          <a:prstGeom prst="plus">
-            <a:avLst>
-              <a:gd name="adj" fmla="val 34992"/>
-            </a:avLst>
-          </a:prstGeom>
-          <a:solidFill>
-            <a:schemeClr val="bg1"/>
-          </a:solidFill>
-          <a:ln w="76200">
-            <a:solidFill>
-              <a:schemeClr val="bg1"/>
-            </a:solidFill>
-          </a:ln>
-        </p:spPr>
-        <p:style>
-          <a:lnRef idx="2">
-            <a:schemeClr val="accent1">
-              <a:shade val="50000"/>
-            </a:schemeClr>
-          </a:lnRef>
-          <a:fillRef idx="1">
-            <a:schemeClr val="accent1"/>
-          </a:fillRef>
-          <a:effectRef idx="0">
-            <a:schemeClr val="accent1"/>
-          </a:effectRef>
-          <a:fontRef idx="minor">
-            <a:schemeClr val="lt1"/>
-          </a:fontRef>
-        </p:style>
-        <p:txBody>
-          <a:bodyPr rtlCol="0" anchor="ctr"/>
-          <a:lstStyle/>
-          <a:p>
-            <a:pPr algn="ctr"/>
-            <a:endParaRPr lang="pt-BR"/>
+            <a:endParaRPr lang="pt-BR">
+              <a:solidFill>
+                <a:schemeClr val="tx1"/>
+              </a:solidFill>
+            </a:endParaRPr>
           </a:p>
         </p:txBody>
       </p:sp>
     </p:spTree>
     <p:extLst>
       <p:ext uri="{BB962C8B-B14F-4D97-AF65-F5344CB8AC3E}">
-        <p14:creationId xmlns:p14="http://schemas.microsoft.com/office/powerpoint/2010/main" val="601465837"/>
+        <p14:creationId xmlns:p14="http://schemas.microsoft.com/office/powerpoint/2010/main" val="3543225107"/>
       </p:ext>
     </p:extLst>
   </p:cSld>
@@ -5624,38 +5623,35 @@
         <p:spPr>
           <a:xfrm>
             <a:off x="179881" y="179881"/>
-            <a:ext cx="10440000" cy="10440000"/>
+            <a:ext cx="10440000" cy="9000000"/>
           </a:xfrm>
           <a:prstGeom prst="roundRect">
             <a:avLst>
-              <a:gd name="adj" fmla="val 0"/>
+              <a:gd name="adj" fmla="val 14844"/>
             </a:avLst>
           </a:prstGeom>
           <a:gradFill flip="none" rotWithShape="1">
             <a:gsLst>
               <a:gs pos="0">
-                <a:schemeClr val="accent5">
-                  <a:lumMod val="50000"/>
+                <a:srgbClr val="CC0066">
                   <a:shade val="30000"/>
                   <a:satMod val="115000"/>
-                </a:schemeClr>
+                </a:srgbClr>
               </a:gs>
               <a:gs pos="50000">
-                <a:schemeClr val="accent5">
-                  <a:lumMod val="50000"/>
+                <a:srgbClr val="CC0066">
                   <a:shade val="67500"/>
                   <a:satMod val="115000"/>
-                </a:schemeClr>
+                </a:srgbClr>
               </a:gs>
               <a:gs pos="100000">
-                <a:schemeClr val="accent5">
-                  <a:lumMod val="50000"/>
+                <a:srgbClr val="CC0066">
                   <a:shade val="100000"/>
                   <a:satMod val="115000"/>
-                </a:schemeClr>
+                </a:srgbClr>
               </a:gs>
             </a:gsLst>
-            <a:lin ang="5400000" scaled="1"/>
+            <a:lin ang="16200000" scaled="1"/>
             <a:tileRect/>
           </a:gradFill>
           <a:ln>
@@ -5684,7 +5680,11 @@
           <a:lstStyle/>
           <a:p>
             <a:pPr algn="ctr"/>
-            <a:endParaRPr lang="pt-BR"/>
+            <a:endParaRPr lang="pt-BR" dirty="0">
+              <a:solidFill>
+                <a:prstClr val="white"/>
+              </a:solidFill>
+            </a:endParaRPr>
           </a:p>
         </p:txBody>
       </p:sp>
@@ -5696,19 +5696,15 @@
         </p:nvSpPr>
         <p:spPr>
           <a:xfrm>
-            <a:off x="179881" y="8784457"/>
-            <a:ext cx="10440000" cy="1800000"/>
+            <a:off x="179881" y="9180481"/>
+            <a:ext cx="10440000" cy="1620000"/>
           </a:xfrm>
           <a:prstGeom prst="rect">
             <a:avLst/>
           </a:prstGeom>
-          <a:solidFill>
-            <a:schemeClr val="bg1"/>
-          </a:solidFill>
+          <a:noFill/>
           <a:ln w="76200">
-            <a:solidFill>
-              <a:schemeClr val="bg1"/>
-            </a:solidFill>
+            <a:noFill/>
           </a:ln>
         </p:spPr>
         <p:style>
@@ -5733,342 +5729,57 @@
           <a:p>
             <a:pPr algn="ctr"/>
             <a:r>
-              <a:rPr lang="pt-BR" sz="14400" b="1" dirty="0" smtClean="0">
+              <a:rPr lang="pt-BR" sz="12000" b="1" dirty="0" smtClean="0">
                 <a:solidFill>
-                  <a:schemeClr val="accent5">
-                    <a:lumMod val="50000"/>
-                  </a:schemeClr>
+                  <a:srgbClr val="CC0066"/>
                 </a:solidFill>
                 <a:latin typeface="Candara" pitchFamily="34" charset="0"/>
               </a:rPr>
-              <a:t>Relatórios</a:t>
+              <a:t>Pessoas</a:t>
             </a:r>
-            <a:endParaRPr lang="pt-BR" sz="14400" b="1" dirty="0">
+            <a:endParaRPr lang="pt-BR" sz="12000" b="1" dirty="0">
               <a:solidFill>
-                <a:schemeClr val="accent5">
-                  <a:lumMod val="50000"/>
-                </a:schemeClr>
+                <a:srgbClr val="CC0066"/>
               </a:solidFill>
               <a:latin typeface="Candara" pitchFamily="34" charset="0"/>
             </a:endParaRPr>
           </a:p>
         </p:txBody>
       </p:sp>
-      <p:sp>
-        <p:nvSpPr>
-          <p:cNvPr id="14" name="Pergaminho vertical 13"/>
-          <p:cNvSpPr/>
-          <p:nvPr/>
-        </p:nvSpPr>
-        <p:spPr>
-          <a:xfrm>
-            <a:off x="1619881" y="1080161"/>
-            <a:ext cx="7560000" cy="6840000"/>
-          </a:xfrm>
-          <a:prstGeom prst="verticalScroll">
-            <a:avLst>
-              <a:gd name="adj" fmla="val 12500"/>
-            </a:avLst>
-          </a:prstGeom>
-          <a:solidFill>
-            <a:schemeClr val="bg1"/>
-          </a:solidFill>
-          <a:ln w="101600">
-            <a:solidFill>
-              <a:schemeClr val="accent5">
-                <a:lumMod val="50000"/>
-              </a:schemeClr>
-            </a:solidFill>
-          </a:ln>
-        </p:spPr>
-        <p:style>
-          <a:lnRef idx="2">
-            <a:schemeClr val="accent1">
-              <a:shade val="50000"/>
-            </a:schemeClr>
-          </a:lnRef>
-          <a:fillRef idx="1">
-            <a:schemeClr val="accent1"/>
-          </a:fillRef>
-          <a:effectRef idx="0">
-            <a:schemeClr val="accent1"/>
-          </a:effectRef>
-          <a:fontRef idx="minor">
-            <a:schemeClr val="lt1"/>
-          </a:fontRef>
-        </p:style>
-        <p:txBody>
-          <a:bodyPr rtlCol="0" anchor="ctr"/>
-          <a:lstStyle/>
-          <a:p>
-            <a:pPr algn="ctr"/>
-            <a:endParaRPr lang="pt-BR"/>
-          </a:p>
-        </p:txBody>
-      </p:sp>
-      <p:cxnSp>
-        <p:nvCxnSpPr>
-          <p:cNvPr id="18" name="Conector reto 17"/>
-          <p:cNvCxnSpPr/>
-          <p:nvPr/>
-        </p:nvCxnSpPr>
-        <p:spPr>
-          <a:xfrm>
-            <a:off x="3366135" y="3023617"/>
-            <a:ext cx="4320000" cy="0"/>
-          </a:xfrm>
-          <a:prstGeom prst="line">
+      <p:pic>
+        <p:nvPicPr>
+          <p:cNvPr id="6" name="Imagem 5"/>
+          <p:cNvPicPr>
+            <a:picLocks noChangeAspect="1"/>
+          </p:cNvPicPr>
+          <p:nvPr/>
+        </p:nvPicPr>
+        <p:blipFill>
+          <a:blip r:embed="rId2" cstate="print">
+            <a:extLst>
+              <a:ext uri="{28A0092B-C50C-407E-A947-70E740481C1C}">
+                <a14:useLocalDpi xmlns:a14="http://schemas.microsoft.com/office/drawing/2010/main" val="0"/>
+              </a:ext>
+            </a:extLst>
+          </a:blip>
+          <a:stretch>
+            <a:fillRect/>
+          </a:stretch>
+        </p:blipFill>
+        <p:spPr>
+          <a:xfrm>
+            <a:off x="1439881" y="791369"/>
+            <a:ext cx="7920000" cy="7920000"/>
+          </a:xfrm>
+          <a:prstGeom prst="rect">
             <a:avLst/>
           </a:prstGeom>
-          <a:ln w="114300">
-            <a:solidFill>
-              <a:schemeClr val="accent5">
-                <a:lumMod val="50000"/>
-              </a:schemeClr>
-            </a:solidFill>
-          </a:ln>
-        </p:spPr>
-        <p:style>
-          <a:lnRef idx="1">
-            <a:schemeClr val="accent1"/>
-          </a:lnRef>
-          <a:fillRef idx="0">
-            <a:schemeClr val="accent1"/>
-          </a:fillRef>
-          <a:effectRef idx="0">
-            <a:schemeClr val="accent1"/>
-          </a:effectRef>
-          <a:fontRef idx="minor">
-            <a:schemeClr val="tx1"/>
-          </a:fontRef>
-        </p:style>
-      </p:cxnSp>
-      <p:cxnSp>
-        <p:nvCxnSpPr>
-          <p:cNvPr id="19" name="Conector reto 18"/>
-          <p:cNvCxnSpPr/>
-          <p:nvPr/>
-        </p:nvCxnSpPr>
-        <p:spPr>
-          <a:xfrm>
-            <a:off x="3366135" y="3599681"/>
-            <a:ext cx="4320000" cy="0"/>
-          </a:xfrm>
-          <a:prstGeom prst="line">
-            <a:avLst/>
-          </a:prstGeom>
-          <a:ln w="114300">
-            <a:solidFill>
-              <a:schemeClr val="accent5">
-                <a:lumMod val="50000"/>
-              </a:schemeClr>
-            </a:solidFill>
-          </a:ln>
-        </p:spPr>
-        <p:style>
-          <a:lnRef idx="1">
-            <a:schemeClr val="accent1"/>
-          </a:lnRef>
-          <a:fillRef idx="0">
-            <a:schemeClr val="accent1"/>
-          </a:fillRef>
-          <a:effectRef idx="0">
-            <a:schemeClr val="accent1"/>
-          </a:effectRef>
-          <a:fontRef idx="minor">
-            <a:schemeClr val="tx1"/>
-          </a:fontRef>
-        </p:style>
-      </p:cxnSp>
-      <p:cxnSp>
-        <p:nvCxnSpPr>
-          <p:cNvPr id="20" name="Conector reto 19"/>
-          <p:cNvCxnSpPr/>
-          <p:nvPr/>
-        </p:nvCxnSpPr>
-        <p:spPr>
-          <a:xfrm>
-            <a:off x="3366135" y="4175745"/>
-            <a:ext cx="4320000" cy="0"/>
-          </a:xfrm>
-          <a:prstGeom prst="line">
-            <a:avLst/>
-          </a:prstGeom>
-          <a:ln w="114300">
-            <a:solidFill>
-              <a:schemeClr val="accent5">
-                <a:lumMod val="50000"/>
-              </a:schemeClr>
-            </a:solidFill>
-          </a:ln>
-        </p:spPr>
-        <p:style>
-          <a:lnRef idx="1">
-            <a:schemeClr val="accent1"/>
-          </a:lnRef>
-          <a:fillRef idx="0">
-            <a:schemeClr val="accent1"/>
-          </a:fillRef>
-          <a:effectRef idx="0">
-            <a:schemeClr val="accent1"/>
-          </a:effectRef>
-          <a:fontRef idx="minor">
-            <a:schemeClr val="tx1"/>
-          </a:fontRef>
-        </p:style>
-      </p:cxnSp>
-      <p:cxnSp>
-        <p:nvCxnSpPr>
-          <p:cNvPr id="21" name="Conector reto 20"/>
-          <p:cNvCxnSpPr/>
-          <p:nvPr/>
-        </p:nvCxnSpPr>
-        <p:spPr>
-          <a:xfrm>
-            <a:off x="3366135" y="4751809"/>
-            <a:ext cx="4320000" cy="0"/>
-          </a:xfrm>
-          <a:prstGeom prst="line">
-            <a:avLst/>
-          </a:prstGeom>
-          <a:ln w="114300">
-            <a:solidFill>
-              <a:schemeClr val="accent5">
-                <a:lumMod val="50000"/>
-              </a:schemeClr>
-            </a:solidFill>
-          </a:ln>
-        </p:spPr>
-        <p:style>
-          <a:lnRef idx="1">
-            <a:schemeClr val="accent1"/>
-          </a:lnRef>
-          <a:fillRef idx="0">
-            <a:schemeClr val="accent1"/>
-          </a:fillRef>
-          <a:effectRef idx="0">
-            <a:schemeClr val="accent1"/>
-          </a:effectRef>
-          <a:fontRef idx="minor">
-            <a:schemeClr val="tx1"/>
-          </a:fontRef>
-        </p:style>
-      </p:cxnSp>
-      <p:cxnSp>
-        <p:nvCxnSpPr>
-          <p:cNvPr id="22" name="Conector reto 21"/>
-          <p:cNvCxnSpPr/>
-          <p:nvPr/>
-        </p:nvCxnSpPr>
-        <p:spPr>
-          <a:xfrm>
-            <a:off x="3366135" y="5327873"/>
-            <a:ext cx="4320000" cy="0"/>
-          </a:xfrm>
-          <a:prstGeom prst="line">
-            <a:avLst/>
-          </a:prstGeom>
-          <a:ln w="114300">
-            <a:solidFill>
-              <a:schemeClr val="accent5">
-                <a:lumMod val="50000"/>
-              </a:schemeClr>
-            </a:solidFill>
-          </a:ln>
-        </p:spPr>
-        <p:style>
-          <a:lnRef idx="1">
-            <a:schemeClr val="accent1"/>
-          </a:lnRef>
-          <a:fillRef idx="0">
-            <a:schemeClr val="accent1"/>
-          </a:fillRef>
-          <a:effectRef idx="0">
-            <a:schemeClr val="accent1"/>
-          </a:effectRef>
-          <a:fontRef idx="minor">
-            <a:schemeClr val="tx1"/>
-          </a:fontRef>
-        </p:style>
-      </p:cxnSp>
-      <p:cxnSp>
-        <p:nvCxnSpPr>
-          <p:cNvPr id="23" name="Conector reto 22"/>
-          <p:cNvCxnSpPr/>
-          <p:nvPr/>
-        </p:nvCxnSpPr>
-        <p:spPr>
-          <a:xfrm>
-            <a:off x="3366135" y="5903937"/>
-            <a:ext cx="4320000" cy="0"/>
-          </a:xfrm>
-          <a:prstGeom prst="line">
-            <a:avLst/>
-          </a:prstGeom>
-          <a:ln w="114300">
-            <a:solidFill>
-              <a:schemeClr val="accent5">
-                <a:lumMod val="50000"/>
-              </a:schemeClr>
-            </a:solidFill>
-          </a:ln>
-        </p:spPr>
-        <p:style>
-          <a:lnRef idx="1">
-            <a:schemeClr val="accent1"/>
-          </a:lnRef>
-          <a:fillRef idx="0">
-            <a:schemeClr val="accent1"/>
-          </a:fillRef>
-          <a:effectRef idx="0">
-            <a:schemeClr val="accent1"/>
-          </a:effectRef>
-          <a:fontRef idx="minor">
-            <a:schemeClr val="tx1"/>
-          </a:fontRef>
-        </p:style>
-      </p:cxnSp>
-      <p:cxnSp>
-        <p:nvCxnSpPr>
-          <p:cNvPr id="24" name="Conector reto 23"/>
-          <p:cNvCxnSpPr/>
-          <p:nvPr/>
-        </p:nvCxnSpPr>
-        <p:spPr>
-          <a:xfrm>
-            <a:off x="3384137" y="6480001"/>
-            <a:ext cx="4320000" cy="0"/>
-          </a:xfrm>
-          <a:prstGeom prst="line">
-            <a:avLst/>
-          </a:prstGeom>
-          <a:ln w="114300">
-            <a:solidFill>
-              <a:schemeClr val="accent5">
-                <a:lumMod val="50000"/>
-              </a:schemeClr>
-            </a:solidFill>
-          </a:ln>
-        </p:spPr>
-        <p:style>
-          <a:lnRef idx="1">
-            <a:schemeClr val="accent1"/>
-          </a:lnRef>
-          <a:fillRef idx="0">
-            <a:schemeClr val="accent1"/>
-          </a:fillRef>
-          <a:effectRef idx="0">
-            <a:schemeClr val="accent1"/>
-          </a:effectRef>
-          <a:fontRef idx="minor">
-            <a:schemeClr val="tx1"/>
-          </a:fontRef>
-        </p:style>
-      </p:cxnSp>
+        </p:spPr>
+      </p:pic>
     </p:spTree>
     <p:extLst>
       <p:ext uri="{BB962C8B-B14F-4D97-AF65-F5344CB8AC3E}">
-        <p14:creationId xmlns:p14="http://schemas.microsoft.com/office/powerpoint/2010/main" val="601465837"/>
+        <p14:creationId xmlns:p14="http://schemas.microsoft.com/office/powerpoint/2010/main" val="833281821"/>
       </p:ext>
     </p:extLst>
   </p:cSld>
@@ -6121,6 +5832,875 @@
           <a:gradFill flip="none" rotWithShape="1">
             <a:gsLst>
               <a:gs pos="0">
+                <a:schemeClr val="accent6">
+                  <a:lumMod val="75000"/>
+                  <a:shade val="30000"/>
+                  <a:satMod val="115000"/>
+                </a:schemeClr>
+              </a:gs>
+              <a:gs pos="50000">
+                <a:schemeClr val="accent6">
+                  <a:lumMod val="75000"/>
+                  <a:shade val="67500"/>
+                  <a:satMod val="115000"/>
+                </a:schemeClr>
+              </a:gs>
+              <a:gs pos="100000">
+                <a:schemeClr val="accent6">
+                  <a:lumMod val="75000"/>
+                  <a:shade val="100000"/>
+                  <a:satMod val="115000"/>
+                </a:schemeClr>
+              </a:gs>
+            </a:gsLst>
+            <a:lin ang="16200000" scaled="1"/>
+            <a:tileRect/>
+          </a:gradFill>
+          <a:ln>
+            <a:noFill/>
+          </a:ln>
+          <a:effectLst/>
+        </p:spPr>
+        <p:style>
+          <a:lnRef idx="2">
+            <a:schemeClr val="accent1">
+              <a:shade val="50000"/>
+            </a:schemeClr>
+          </a:lnRef>
+          <a:fillRef idx="1">
+            <a:schemeClr val="accent1"/>
+          </a:fillRef>
+          <a:effectRef idx="0">
+            <a:schemeClr val="accent1"/>
+          </a:effectRef>
+          <a:fontRef idx="minor">
+            <a:schemeClr val="lt1"/>
+          </a:fontRef>
+        </p:style>
+        <p:txBody>
+          <a:bodyPr rtlCol="0" anchor="ctr"/>
+          <a:lstStyle/>
+          <a:p>
+            <a:pPr algn="ctr"/>
+            <a:endParaRPr lang="pt-BR"/>
+          </a:p>
+        </p:txBody>
+      </p:sp>
+      <p:sp>
+        <p:nvSpPr>
+          <p:cNvPr id="15" name="Retângulo de cantos arredondados 14"/>
+          <p:cNvSpPr/>
+          <p:nvPr/>
+        </p:nvSpPr>
+        <p:spPr>
+          <a:xfrm>
+            <a:off x="7128193" y="4319761"/>
+            <a:ext cx="1080000" cy="1800000"/>
+          </a:xfrm>
+          <a:prstGeom prst="roundRect">
+            <a:avLst/>
+          </a:prstGeom>
+          <a:solidFill>
+            <a:schemeClr val="bg1"/>
+          </a:solidFill>
+          <a:ln w="76200">
+            <a:solidFill>
+              <a:schemeClr val="bg1"/>
+            </a:solidFill>
+          </a:ln>
+        </p:spPr>
+        <p:style>
+          <a:lnRef idx="2">
+            <a:schemeClr val="accent1">
+              <a:shade val="50000"/>
+            </a:schemeClr>
+          </a:lnRef>
+          <a:fillRef idx="1">
+            <a:schemeClr val="accent1"/>
+          </a:fillRef>
+          <a:effectRef idx="0">
+            <a:schemeClr val="accent1"/>
+          </a:effectRef>
+          <a:fontRef idx="minor">
+            <a:schemeClr val="lt1"/>
+          </a:fontRef>
+        </p:style>
+        <p:txBody>
+          <a:bodyPr rtlCol="0" anchor="ctr"/>
+          <a:lstStyle/>
+          <a:p>
+            <a:pPr algn="ctr"/>
+            <a:endParaRPr lang="pt-BR"/>
+          </a:p>
+        </p:txBody>
+      </p:sp>
+      <p:sp>
+        <p:nvSpPr>
+          <p:cNvPr id="16" name="Retângulo de cantos arredondados 15"/>
+          <p:cNvSpPr/>
+          <p:nvPr/>
+        </p:nvSpPr>
+        <p:spPr>
+          <a:xfrm>
+            <a:off x="2591689" y="4292965"/>
+            <a:ext cx="1080000" cy="1800000"/>
+          </a:xfrm>
+          <a:prstGeom prst="roundRect">
+            <a:avLst/>
+          </a:prstGeom>
+          <a:solidFill>
+            <a:schemeClr val="bg1"/>
+          </a:solidFill>
+          <a:ln w="76200">
+            <a:solidFill>
+              <a:schemeClr val="bg1"/>
+            </a:solidFill>
+          </a:ln>
+        </p:spPr>
+        <p:style>
+          <a:lnRef idx="2">
+            <a:schemeClr val="accent1">
+              <a:shade val="50000"/>
+            </a:schemeClr>
+          </a:lnRef>
+          <a:fillRef idx="1">
+            <a:schemeClr val="accent1"/>
+          </a:fillRef>
+          <a:effectRef idx="0">
+            <a:schemeClr val="accent1"/>
+          </a:effectRef>
+          <a:fontRef idx="minor">
+            <a:schemeClr val="lt1"/>
+          </a:fontRef>
+        </p:style>
+        <p:txBody>
+          <a:bodyPr rtlCol="0" anchor="ctr"/>
+          <a:lstStyle/>
+          <a:p>
+            <a:pPr algn="ctr"/>
+            <a:endParaRPr lang="pt-BR"/>
+          </a:p>
+        </p:txBody>
+      </p:sp>
+      <p:cxnSp>
+        <p:nvCxnSpPr>
+          <p:cNvPr id="17" name="Conector em curva 16"/>
+          <p:cNvCxnSpPr>
+            <a:stCxn id="16" idx="0"/>
+            <a:endCxn id="15" idx="0"/>
+          </p:cNvCxnSpPr>
+          <p:nvPr/>
+        </p:nvCxnSpPr>
+        <p:spPr>
+          <a:xfrm rot="16200000" flipH="1">
+            <a:off x="5386543" y="2038111"/>
+            <a:ext cx="26796" cy="4536504"/>
+          </a:xfrm>
+          <a:prstGeom prst="curvedConnector3">
+            <a:avLst>
+              <a:gd name="adj1" fmla="val -7286420"/>
+            </a:avLst>
+          </a:prstGeom>
+          <a:ln w="254000">
+            <a:solidFill>
+              <a:schemeClr val="bg1"/>
+            </a:solidFill>
+          </a:ln>
+        </p:spPr>
+        <p:style>
+          <a:lnRef idx="1">
+            <a:schemeClr val="accent1"/>
+          </a:lnRef>
+          <a:fillRef idx="0">
+            <a:schemeClr val="accent1"/>
+          </a:fillRef>
+          <a:effectRef idx="0">
+            <a:schemeClr val="accent1"/>
+          </a:effectRef>
+          <a:fontRef idx="minor">
+            <a:schemeClr val="tx1"/>
+          </a:fontRef>
+        </p:style>
+      </p:cxnSp>
+      <p:sp>
+        <p:nvSpPr>
+          <p:cNvPr id="18" name="Elipse 17"/>
+          <p:cNvSpPr/>
+          <p:nvPr/>
+        </p:nvSpPr>
+        <p:spPr>
+          <a:xfrm>
+            <a:off x="5795985" y="6876105"/>
+            <a:ext cx="540000" cy="540000"/>
+          </a:xfrm>
+          <a:prstGeom prst="ellipse">
+            <a:avLst/>
+          </a:prstGeom>
+          <a:solidFill>
+            <a:schemeClr val="bg1"/>
+          </a:solidFill>
+          <a:ln w="76200">
+            <a:solidFill>
+              <a:schemeClr val="bg1"/>
+            </a:solidFill>
+          </a:ln>
+        </p:spPr>
+        <p:style>
+          <a:lnRef idx="2">
+            <a:schemeClr val="accent1">
+              <a:shade val="50000"/>
+            </a:schemeClr>
+          </a:lnRef>
+          <a:fillRef idx="1">
+            <a:schemeClr val="accent1"/>
+          </a:fillRef>
+          <a:effectRef idx="0">
+            <a:schemeClr val="accent1"/>
+          </a:effectRef>
+          <a:fontRef idx="minor">
+            <a:schemeClr val="lt1"/>
+          </a:fontRef>
+        </p:style>
+        <p:txBody>
+          <a:bodyPr rtlCol="0" anchor="ctr"/>
+          <a:lstStyle/>
+          <a:p>
+            <a:pPr algn="ctr"/>
+            <a:endParaRPr lang="pt-BR"/>
+          </a:p>
+        </p:txBody>
+      </p:sp>
+      <p:cxnSp>
+        <p:nvCxnSpPr>
+          <p:cNvPr id="19" name="Conector em curva 18"/>
+          <p:cNvCxnSpPr>
+            <a:stCxn id="15" idx="2"/>
+            <a:endCxn id="18" idx="6"/>
+          </p:cNvCxnSpPr>
+          <p:nvPr/>
+        </p:nvCxnSpPr>
+        <p:spPr>
+          <a:xfrm rot="5400000">
+            <a:off x="6488917" y="5966829"/>
+            <a:ext cx="1026344" cy="1332208"/>
+          </a:xfrm>
+          <a:prstGeom prst="curvedConnector2">
+            <a:avLst/>
+          </a:prstGeom>
+          <a:ln w="127000">
+            <a:solidFill>
+              <a:schemeClr val="bg1"/>
+            </a:solidFill>
+          </a:ln>
+        </p:spPr>
+        <p:style>
+          <a:lnRef idx="1">
+            <a:schemeClr val="accent1"/>
+          </a:lnRef>
+          <a:fillRef idx="0">
+            <a:schemeClr val="accent1"/>
+          </a:fillRef>
+          <a:effectRef idx="0">
+            <a:schemeClr val="accent1"/>
+          </a:effectRef>
+          <a:fontRef idx="minor">
+            <a:schemeClr val="tx1"/>
+          </a:fontRef>
+        </p:style>
+      </p:cxnSp>
+      <p:sp>
+        <p:nvSpPr>
+          <p:cNvPr id="5" name="Cruz 4"/>
+          <p:cNvSpPr/>
+          <p:nvPr/>
+        </p:nvSpPr>
+        <p:spPr>
+          <a:xfrm>
+            <a:off x="935385" y="7416105"/>
+            <a:ext cx="2520000" cy="2520000"/>
+          </a:xfrm>
+          <a:prstGeom prst="plus">
+            <a:avLst>
+              <a:gd name="adj" fmla="val 34992"/>
+            </a:avLst>
+          </a:prstGeom>
+          <a:solidFill>
+            <a:schemeClr val="bg1"/>
+          </a:solidFill>
+          <a:ln w="76200">
+            <a:solidFill>
+              <a:schemeClr val="bg1"/>
+            </a:solidFill>
+          </a:ln>
+        </p:spPr>
+        <p:style>
+          <a:lnRef idx="2">
+            <a:schemeClr val="accent1">
+              <a:shade val="50000"/>
+            </a:schemeClr>
+          </a:lnRef>
+          <a:fillRef idx="1">
+            <a:schemeClr val="accent1"/>
+          </a:fillRef>
+          <a:effectRef idx="0">
+            <a:schemeClr val="accent1"/>
+          </a:effectRef>
+          <a:fontRef idx="minor">
+            <a:schemeClr val="lt1"/>
+          </a:fontRef>
+        </p:style>
+        <p:txBody>
+          <a:bodyPr rtlCol="0" anchor="ctr"/>
+          <a:lstStyle/>
+          <a:p>
+            <a:pPr algn="ctr"/>
+            <a:endParaRPr lang="pt-BR"/>
+          </a:p>
+        </p:txBody>
+      </p:sp>
+    </p:spTree>
+    <p:extLst>
+      <p:ext uri="{BB962C8B-B14F-4D97-AF65-F5344CB8AC3E}">
+        <p14:creationId xmlns:p14="http://schemas.microsoft.com/office/powerpoint/2010/main" val="601465837"/>
+      </p:ext>
+    </p:extLst>
+  </p:cSld>
+  <p:clrMapOvr>
+    <a:masterClrMapping/>
+  </p:clrMapOvr>
+  <p:timing>
+    <p:tnLst>
+      <p:par>
+        <p:cTn id="1" dur="indefinite" restart="never" nodeType="tmRoot"/>
+      </p:par>
+    </p:tnLst>
+  </p:timing>
+</p:sld>
+</file>
+
+<file path=ppt/slides/slide17.xml><?xml version="1.0" encoding="utf-8"?>
+<p:sld xmlns:a="http://schemas.openxmlformats.org/drawingml/2006/main" xmlns:r="http://schemas.openxmlformats.org/officeDocument/2006/relationships" xmlns:p="http://schemas.openxmlformats.org/presentationml/2006/main">
+  <p:cSld>
+    <p:spTree>
+      <p:nvGrpSpPr>
+        <p:cNvPr id="1" name=""/>
+        <p:cNvGrpSpPr/>
+        <p:nvPr/>
+      </p:nvGrpSpPr>
+      <p:grpSpPr>
+        <a:xfrm>
+          <a:off x="0" y="0"/>
+          <a:ext cx="0" cy="0"/>
+          <a:chOff x="0" y="0"/>
+          <a:chExt cx="0" cy="0"/>
+        </a:xfrm>
+      </p:grpSpPr>
+      <p:sp>
+        <p:nvSpPr>
+          <p:cNvPr id="4" name="Retângulo de cantos arredondados 3"/>
+          <p:cNvSpPr/>
+          <p:nvPr/>
+        </p:nvSpPr>
+        <p:spPr>
+          <a:xfrm>
+            <a:off x="179881" y="179881"/>
+            <a:ext cx="10440000" cy="10440000"/>
+          </a:xfrm>
+          <a:prstGeom prst="roundRect">
+            <a:avLst>
+              <a:gd name="adj" fmla="val 0"/>
+            </a:avLst>
+          </a:prstGeom>
+          <a:gradFill flip="none" rotWithShape="1">
+            <a:gsLst>
+              <a:gs pos="0">
+                <a:schemeClr val="accent5">
+                  <a:lumMod val="50000"/>
+                  <a:shade val="30000"/>
+                  <a:satMod val="115000"/>
+                </a:schemeClr>
+              </a:gs>
+              <a:gs pos="50000">
+                <a:schemeClr val="accent5">
+                  <a:lumMod val="50000"/>
+                  <a:shade val="67500"/>
+                  <a:satMod val="115000"/>
+                </a:schemeClr>
+              </a:gs>
+              <a:gs pos="100000">
+                <a:schemeClr val="accent5">
+                  <a:lumMod val="50000"/>
+                  <a:shade val="100000"/>
+                  <a:satMod val="115000"/>
+                </a:schemeClr>
+              </a:gs>
+            </a:gsLst>
+            <a:lin ang="5400000" scaled="1"/>
+            <a:tileRect/>
+          </a:gradFill>
+          <a:ln>
+            <a:noFill/>
+          </a:ln>
+          <a:effectLst/>
+        </p:spPr>
+        <p:style>
+          <a:lnRef idx="2">
+            <a:schemeClr val="accent1">
+              <a:shade val="50000"/>
+            </a:schemeClr>
+          </a:lnRef>
+          <a:fillRef idx="1">
+            <a:schemeClr val="accent1"/>
+          </a:fillRef>
+          <a:effectRef idx="0">
+            <a:schemeClr val="accent1"/>
+          </a:effectRef>
+          <a:fontRef idx="minor">
+            <a:schemeClr val="lt1"/>
+          </a:fontRef>
+        </p:style>
+        <p:txBody>
+          <a:bodyPr rtlCol="0" anchor="ctr"/>
+          <a:lstStyle/>
+          <a:p>
+            <a:pPr algn="ctr"/>
+            <a:endParaRPr lang="pt-BR"/>
+          </a:p>
+        </p:txBody>
+      </p:sp>
+      <p:sp>
+        <p:nvSpPr>
+          <p:cNvPr id="13" name="Retângulo 12"/>
+          <p:cNvSpPr/>
+          <p:nvPr/>
+        </p:nvSpPr>
+        <p:spPr>
+          <a:xfrm>
+            <a:off x="179881" y="8784457"/>
+            <a:ext cx="10440000" cy="1800000"/>
+          </a:xfrm>
+          <a:prstGeom prst="rect">
+            <a:avLst/>
+          </a:prstGeom>
+          <a:solidFill>
+            <a:schemeClr val="bg1"/>
+          </a:solidFill>
+          <a:ln w="76200">
+            <a:solidFill>
+              <a:schemeClr val="bg1"/>
+            </a:solidFill>
+          </a:ln>
+        </p:spPr>
+        <p:style>
+          <a:lnRef idx="2">
+            <a:schemeClr val="accent1">
+              <a:shade val="50000"/>
+            </a:schemeClr>
+          </a:lnRef>
+          <a:fillRef idx="1">
+            <a:schemeClr val="accent1"/>
+          </a:fillRef>
+          <a:effectRef idx="0">
+            <a:schemeClr val="accent1"/>
+          </a:effectRef>
+          <a:fontRef idx="minor">
+            <a:schemeClr val="lt1"/>
+          </a:fontRef>
+        </p:style>
+        <p:txBody>
+          <a:bodyPr rtlCol="0" anchor="ctr"/>
+          <a:lstStyle/>
+          <a:p>
+            <a:pPr algn="ctr"/>
+            <a:r>
+              <a:rPr lang="pt-BR" sz="14400" b="1" dirty="0" smtClean="0">
+                <a:solidFill>
+                  <a:schemeClr val="accent5">
+                    <a:lumMod val="50000"/>
+                  </a:schemeClr>
+                </a:solidFill>
+                <a:latin typeface="Candara" pitchFamily="34" charset="0"/>
+              </a:rPr>
+              <a:t>Relatórios</a:t>
+            </a:r>
+            <a:endParaRPr lang="pt-BR" sz="14400" b="1" dirty="0">
+              <a:solidFill>
+                <a:schemeClr val="accent5">
+                  <a:lumMod val="50000"/>
+                </a:schemeClr>
+              </a:solidFill>
+              <a:latin typeface="Candara" pitchFamily="34" charset="0"/>
+            </a:endParaRPr>
+          </a:p>
+        </p:txBody>
+      </p:sp>
+      <p:sp>
+        <p:nvSpPr>
+          <p:cNvPr id="14" name="Pergaminho vertical 13"/>
+          <p:cNvSpPr/>
+          <p:nvPr/>
+        </p:nvSpPr>
+        <p:spPr>
+          <a:xfrm>
+            <a:off x="1619881" y="1080161"/>
+            <a:ext cx="7560000" cy="6840000"/>
+          </a:xfrm>
+          <a:prstGeom prst="verticalScroll">
+            <a:avLst>
+              <a:gd name="adj" fmla="val 12500"/>
+            </a:avLst>
+          </a:prstGeom>
+          <a:solidFill>
+            <a:schemeClr val="bg1"/>
+          </a:solidFill>
+          <a:ln w="101600">
+            <a:solidFill>
+              <a:schemeClr val="accent5">
+                <a:lumMod val="50000"/>
+              </a:schemeClr>
+            </a:solidFill>
+          </a:ln>
+        </p:spPr>
+        <p:style>
+          <a:lnRef idx="2">
+            <a:schemeClr val="accent1">
+              <a:shade val="50000"/>
+            </a:schemeClr>
+          </a:lnRef>
+          <a:fillRef idx="1">
+            <a:schemeClr val="accent1"/>
+          </a:fillRef>
+          <a:effectRef idx="0">
+            <a:schemeClr val="accent1"/>
+          </a:effectRef>
+          <a:fontRef idx="minor">
+            <a:schemeClr val="lt1"/>
+          </a:fontRef>
+        </p:style>
+        <p:txBody>
+          <a:bodyPr rtlCol="0" anchor="ctr"/>
+          <a:lstStyle/>
+          <a:p>
+            <a:pPr algn="ctr"/>
+            <a:endParaRPr lang="pt-BR"/>
+          </a:p>
+        </p:txBody>
+      </p:sp>
+      <p:cxnSp>
+        <p:nvCxnSpPr>
+          <p:cNvPr id="18" name="Conector reto 17"/>
+          <p:cNvCxnSpPr/>
+          <p:nvPr/>
+        </p:nvCxnSpPr>
+        <p:spPr>
+          <a:xfrm>
+            <a:off x="3366135" y="3023617"/>
+            <a:ext cx="4320000" cy="0"/>
+          </a:xfrm>
+          <a:prstGeom prst="line">
+            <a:avLst/>
+          </a:prstGeom>
+          <a:ln w="114300">
+            <a:solidFill>
+              <a:schemeClr val="accent5">
+                <a:lumMod val="50000"/>
+              </a:schemeClr>
+            </a:solidFill>
+          </a:ln>
+        </p:spPr>
+        <p:style>
+          <a:lnRef idx="1">
+            <a:schemeClr val="accent1"/>
+          </a:lnRef>
+          <a:fillRef idx="0">
+            <a:schemeClr val="accent1"/>
+          </a:fillRef>
+          <a:effectRef idx="0">
+            <a:schemeClr val="accent1"/>
+          </a:effectRef>
+          <a:fontRef idx="minor">
+            <a:schemeClr val="tx1"/>
+          </a:fontRef>
+        </p:style>
+      </p:cxnSp>
+      <p:cxnSp>
+        <p:nvCxnSpPr>
+          <p:cNvPr id="19" name="Conector reto 18"/>
+          <p:cNvCxnSpPr/>
+          <p:nvPr/>
+        </p:nvCxnSpPr>
+        <p:spPr>
+          <a:xfrm>
+            <a:off x="3366135" y="3599681"/>
+            <a:ext cx="4320000" cy="0"/>
+          </a:xfrm>
+          <a:prstGeom prst="line">
+            <a:avLst/>
+          </a:prstGeom>
+          <a:ln w="114300">
+            <a:solidFill>
+              <a:schemeClr val="accent5">
+                <a:lumMod val="50000"/>
+              </a:schemeClr>
+            </a:solidFill>
+          </a:ln>
+        </p:spPr>
+        <p:style>
+          <a:lnRef idx="1">
+            <a:schemeClr val="accent1"/>
+          </a:lnRef>
+          <a:fillRef idx="0">
+            <a:schemeClr val="accent1"/>
+          </a:fillRef>
+          <a:effectRef idx="0">
+            <a:schemeClr val="accent1"/>
+          </a:effectRef>
+          <a:fontRef idx="minor">
+            <a:schemeClr val="tx1"/>
+          </a:fontRef>
+        </p:style>
+      </p:cxnSp>
+      <p:cxnSp>
+        <p:nvCxnSpPr>
+          <p:cNvPr id="20" name="Conector reto 19"/>
+          <p:cNvCxnSpPr/>
+          <p:nvPr/>
+        </p:nvCxnSpPr>
+        <p:spPr>
+          <a:xfrm>
+            <a:off x="3366135" y="4175745"/>
+            <a:ext cx="4320000" cy="0"/>
+          </a:xfrm>
+          <a:prstGeom prst="line">
+            <a:avLst/>
+          </a:prstGeom>
+          <a:ln w="114300">
+            <a:solidFill>
+              <a:schemeClr val="accent5">
+                <a:lumMod val="50000"/>
+              </a:schemeClr>
+            </a:solidFill>
+          </a:ln>
+        </p:spPr>
+        <p:style>
+          <a:lnRef idx="1">
+            <a:schemeClr val="accent1"/>
+          </a:lnRef>
+          <a:fillRef idx="0">
+            <a:schemeClr val="accent1"/>
+          </a:fillRef>
+          <a:effectRef idx="0">
+            <a:schemeClr val="accent1"/>
+          </a:effectRef>
+          <a:fontRef idx="minor">
+            <a:schemeClr val="tx1"/>
+          </a:fontRef>
+        </p:style>
+      </p:cxnSp>
+      <p:cxnSp>
+        <p:nvCxnSpPr>
+          <p:cNvPr id="21" name="Conector reto 20"/>
+          <p:cNvCxnSpPr/>
+          <p:nvPr/>
+        </p:nvCxnSpPr>
+        <p:spPr>
+          <a:xfrm>
+            <a:off x="3366135" y="4751809"/>
+            <a:ext cx="4320000" cy="0"/>
+          </a:xfrm>
+          <a:prstGeom prst="line">
+            <a:avLst/>
+          </a:prstGeom>
+          <a:ln w="114300">
+            <a:solidFill>
+              <a:schemeClr val="accent5">
+                <a:lumMod val="50000"/>
+              </a:schemeClr>
+            </a:solidFill>
+          </a:ln>
+        </p:spPr>
+        <p:style>
+          <a:lnRef idx="1">
+            <a:schemeClr val="accent1"/>
+          </a:lnRef>
+          <a:fillRef idx="0">
+            <a:schemeClr val="accent1"/>
+          </a:fillRef>
+          <a:effectRef idx="0">
+            <a:schemeClr val="accent1"/>
+          </a:effectRef>
+          <a:fontRef idx="minor">
+            <a:schemeClr val="tx1"/>
+          </a:fontRef>
+        </p:style>
+      </p:cxnSp>
+      <p:cxnSp>
+        <p:nvCxnSpPr>
+          <p:cNvPr id="22" name="Conector reto 21"/>
+          <p:cNvCxnSpPr/>
+          <p:nvPr/>
+        </p:nvCxnSpPr>
+        <p:spPr>
+          <a:xfrm>
+            <a:off x="3366135" y="5327873"/>
+            <a:ext cx="4320000" cy="0"/>
+          </a:xfrm>
+          <a:prstGeom prst="line">
+            <a:avLst/>
+          </a:prstGeom>
+          <a:ln w="114300">
+            <a:solidFill>
+              <a:schemeClr val="accent5">
+                <a:lumMod val="50000"/>
+              </a:schemeClr>
+            </a:solidFill>
+          </a:ln>
+        </p:spPr>
+        <p:style>
+          <a:lnRef idx="1">
+            <a:schemeClr val="accent1"/>
+          </a:lnRef>
+          <a:fillRef idx="0">
+            <a:schemeClr val="accent1"/>
+          </a:fillRef>
+          <a:effectRef idx="0">
+            <a:schemeClr val="accent1"/>
+          </a:effectRef>
+          <a:fontRef idx="minor">
+            <a:schemeClr val="tx1"/>
+          </a:fontRef>
+        </p:style>
+      </p:cxnSp>
+      <p:cxnSp>
+        <p:nvCxnSpPr>
+          <p:cNvPr id="23" name="Conector reto 22"/>
+          <p:cNvCxnSpPr/>
+          <p:nvPr/>
+        </p:nvCxnSpPr>
+        <p:spPr>
+          <a:xfrm>
+            <a:off x="3366135" y="5903937"/>
+            <a:ext cx="4320000" cy="0"/>
+          </a:xfrm>
+          <a:prstGeom prst="line">
+            <a:avLst/>
+          </a:prstGeom>
+          <a:ln w="114300">
+            <a:solidFill>
+              <a:schemeClr val="accent5">
+                <a:lumMod val="50000"/>
+              </a:schemeClr>
+            </a:solidFill>
+          </a:ln>
+        </p:spPr>
+        <p:style>
+          <a:lnRef idx="1">
+            <a:schemeClr val="accent1"/>
+          </a:lnRef>
+          <a:fillRef idx="0">
+            <a:schemeClr val="accent1"/>
+          </a:fillRef>
+          <a:effectRef idx="0">
+            <a:schemeClr val="accent1"/>
+          </a:effectRef>
+          <a:fontRef idx="minor">
+            <a:schemeClr val="tx1"/>
+          </a:fontRef>
+        </p:style>
+      </p:cxnSp>
+      <p:cxnSp>
+        <p:nvCxnSpPr>
+          <p:cNvPr id="24" name="Conector reto 23"/>
+          <p:cNvCxnSpPr/>
+          <p:nvPr/>
+        </p:nvCxnSpPr>
+        <p:spPr>
+          <a:xfrm>
+            <a:off x="3384137" y="6480001"/>
+            <a:ext cx="4320000" cy="0"/>
+          </a:xfrm>
+          <a:prstGeom prst="line">
+            <a:avLst/>
+          </a:prstGeom>
+          <a:ln w="114300">
+            <a:solidFill>
+              <a:schemeClr val="accent5">
+                <a:lumMod val="50000"/>
+              </a:schemeClr>
+            </a:solidFill>
+          </a:ln>
+        </p:spPr>
+        <p:style>
+          <a:lnRef idx="1">
+            <a:schemeClr val="accent1"/>
+          </a:lnRef>
+          <a:fillRef idx="0">
+            <a:schemeClr val="accent1"/>
+          </a:fillRef>
+          <a:effectRef idx="0">
+            <a:schemeClr val="accent1"/>
+          </a:effectRef>
+          <a:fontRef idx="minor">
+            <a:schemeClr val="tx1"/>
+          </a:fontRef>
+        </p:style>
+      </p:cxnSp>
+    </p:spTree>
+    <p:extLst>
+      <p:ext uri="{BB962C8B-B14F-4D97-AF65-F5344CB8AC3E}">
+        <p14:creationId xmlns:p14="http://schemas.microsoft.com/office/powerpoint/2010/main" val="601465837"/>
+      </p:ext>
+    </p:extLst>
+  </p:cSld>
+  <p:clrMapOvr>
+    <a:masterClrMapping/>
+  </p:clrMapOvr>
+  <p:timing>
+    <p:tnLst>
+      <p:par>
+        <p:cTn id="1" dur="indefinite" restart="never" nodeType="tmRoot"/>
+      </p:par>
+    </p:tnLst>
+  </p:timing>
+</p:sld>
+</file>
+
+<file path=ppt/slides/slide18.xml><?xml version="1.0" encoding="utf-8"?>
+<p:sld xmlns:a="http://schemas.openxmlformats.org/drawingml/2006/main" xmlns:r="http://schemas.openxmlformats.org/officeDocument/2006/relationships" xmlns:p="http://schemas.openxmlformats.org/presentationml/2006/main">
+  <p:cSld>
+    <p:spTree>
+      <p:nvGrpSpPr>
+        <p:cNvPr id="1" name=""/>
+        <p:cNvGrpSpPr/>
+        <p:nvPr/>
+      </p:nvGrpSpPr>
+      <p:grpSpPr>
+        <a:xfrm>
+          <a:off x="0" y="0"/>
+          <a:ext cx="0" cy="0"/>
+          <a:chOff x="0" y="0"/>
+          <a:chExt cx="0" cy="0"/>
+        </a:xfrm>
+      </p:grpSpPr>
+      <p:sp>
+        <p:nvSpPr>
+          <p:cNvPr id="4" name="Retângulo de cantos arredondados 3"/>
+          <p:cNvSpPr/>
+          <p:nvPr/>
+        </p:nvSpPr>
+        <p:spPr>
+          <a:xfrm>
+            <a:off x="179881" y="179881"/>
+            <a:ext cx="10440000" cy="10440000"/>
+          </a:xfrm>
+          <a:prstGeom prst="roundRect">
+            <a:avLst>
+              <a:gd name="adj" fmla="val 0"/>
+            </a:avLst>
+          </a:prstGeom>
+          <a:gradFill flip="none" rotWithShape="1">
+            <a:gsLst>
+              <a:gs pos="0">
                 <a:schemeClr val="accent2">
                   <a:lumMod val="75000"/>
                   <a:shade val="30000"/>
@@ -6309,7 +6889,7 @@
 </p:sld>
 </file>
 
-<file path=ppt/slides/slide17.xml><?xml version="1.0" encoding="utf-8"?>
+<file path=ppt/slides/slide19.xml><?xml version="1.0" encoding="utf-8"?>
 <p:sld xmlns:a="http://schemas.openxmlformats.org/drawingml/2006/main" xmlns:r="http://schemas.openxmlformats.org/officeDocument/2006/relationships" xmlns:p="http://schemas.openxmlformats.org/presentationml/2006/main">
   <p:cSld>
     <p:spTree>
@@ -7157,7 +7737,432 @@
 </p:sld>
 </file>
 
-<file path=ppt/slides/slide18.xml><?xml version="1.0" encoding="utf-8"?>
+<file path=ppt/slides/slide2.xml><?xml version="1.0" encoding="utf-8"?>
+<p:sld xmlns:a="http://schemas.openxmlformats.org/drawingml/2006/main" xmlns:r="http://schemas.openxmlformats.org/officeDocument/2006/relationships" xmlns:p="http://schemas.openxmlformats.org/presentationml/2006/main">
+  <p:cSld>
+    <p:spTree>
+      <p:nvGrpSpPr>
+        <p:cNvPr id="1" name=""/>
+        <p:cNvGrpSpPr/>
+        <p:nvPr/>
+      </p:nvGrpSpPr>
+      <p:grpSpPr>
+        <a:xfrm>
+          <a:off x="0" y="0"/>
+          <a:ext cx="0" cy="0"/>
+          <a:chOff x="0" y="0"/>
+          <a:chExt cx="0" cy="0"/>
+        </a:xfrm>
+      </p:grpSpPr>
+      <p:sp>
+        <p:nvSpPr>
+          <p:cNvPr id="4" name="Retângulo de cantos arredondados 3"/>
+          <p:cNvSpPr/>
+          <p:nvPr/>
+        </p:nvSpPr>
+        <p:spPr>
+          <a:xfrm>
+            <a:off x="179881" y="179881"/>
+            <a:ext cx="10440000" cy="9000000"/>
+          </a:xfrm>
+          <a:prstGeom prst="roundRect">
+            <a:avLst>
+              <a:gd name="adj" fmla="val 14844"/>
+            </a:avLst>
+          </a:prstGeom>
+          <a:gradFill flip="none" rotWithShape="1">
+            <a:gsLst>
+              <a:gs pos="0">
+                <a:schemeClr val="accent4">
+                  <a:lumMod val="75000"/>
+                  <a:shade val="30000"/>
+                  <a:satMod val="115000"/>
+                </a:schemeClr>
+              </a:gs>
+              <a:gs pos="50000">
+                <a:schemeClr val="accent4">
+                  <a:lumMod val="75000"/>
+                  <a:shade val="67500"/>
+                  <a:satMod val="115000"/>
+                </a:schemeClr>
+              </a:gs>
+              <a:gs pos="100000">
+                <a:schemeClr val="accent4">
+                  <a:lumMod val="75000"/>
+                  <a:shade val="100000"/>
+                  <a:satMod val="115000"/>
+                </a:schemeClr>
+              </a:gs>
+            </a:gsLst>
+            <a:lin ang="16200000" scaled="1"/>
+            <a:tileRect/>
+          </a:gradFill>
+          <a:ln>
+            <a:noFill/>
+          </a:ln>
+          <a:effectLst/>
+        </p:spPr>
+        <p:style>
+          <a:lnRef idx="2">
+            <a:schemeClr val="accent1">
+              <a:shade val="50000"/>
+            </a:schemeClr>
+          </a:lnRef>
+          <a:fillRef idx="1">
+            <a:schemeClr val="accent1"/>
+          </a:fillRef>
+          <a:effectRef idx="0">
+            <a:schemeClr val="accent1"/>
+          </a:effectRef>
+          <a:fontRef idx="minor">
+            <a:schemeClr val="lt1"/>
+          </a:fontRef>
+        </p:style>
+        <p:txBody>
+          <a:bodyPr rtlCol="0" anchor="ctr"/>
+          <a:lstStyle/>
+          <a:p>
+            <a:pPr algn="ctr"/>
+            <a:endParaRPr lang="pt-BR" dirty="0">
+              <a:solidFill>
+                <a:prstClr val="white"/>
+              </a:solidFill>
+            </a:endParaRPr>
+          </a:p>
+        </p:txBody>
+      </p:sp>
+      <p:sp>
+        <p:nvSpPr>
+          <p:cNvPr id="13" name="Retângulo 12"/>
+          <p:cNvSpPr/>
+          <p:nvPr/>
+        </p:nvSpPr>
+        <p:spPr>
+          <a:xfrm>
+            <a:off x="179881" y="9180481"/>
+            <a:ext cx="10440000" cy="1620000"/>
+          </a:xfrm>
+          <a:prstGeom prst="rect">
+            <a:avLst/>
+          </a:prstGeom>
+          <a:noFill/>
+          <a:ln w="76200">
+            <a:noFill/>
+          </a:ln>
+        </p:spPr>
+        <p:style>
+          <a:lnRef idx="2">
+            <a:schemeClr val="accent1">
+              <a:shade val="50000"/>
+            </a:schemeClr>
+          </a:lnRef>
+          <a:fillRef idx="1">
+            <a:schemeClr val="accent1"/>
+          </a:fillRef>
+          <a:effectRef idx="0">
+            <a:schemeClr val="accent1"/>
+          </a:effectRef>
+          <a:fontRef idx="minor">
+            <a:schemeClr val="lt1"/>
+          </a:fontRef>
+        </p:style>
+        <p:txBody>
+          <a:bodyPr rtlCol="0" anchor="ctr"/>
+          <a:lstStyle/>
+          <a:p>
+            <a:pPr algn="ctr"/>
+            <a:r>
+              <a:rPr lang="pt-BR" sz="12000" b="1" dirty="0" smtClean="0">
+                <a:solidFill>
+                  <a:schemeClr val="accent4">
+                    <a:lumMod val="50000"/>
+                  </a:schemeClr>
+                </a:solidFill>
+                <a:latin typeface="Candara" pitchFamily="34" charset="0"/>
+              </a:rPr>
+              <a:t>Ajustes</a:t>
+            </a:r>
+            <a:endParaRPr lang="pt-BR" sz="12000" b="1" dirty="0">
+              <a:solidFill>
+                <a:schemeClr val="accent4">
+                  <a:lumMod val="50000"/>
+                </a:schemeClr>
+              </a:solidFill>
+              <a:latin typeface="Candara" pitchFamily="34" charset="0"/>
+            </a:endParaRPr>
+          </a:p>
+        </p:txBody>
+      </p:sp>
+      <p:cxnSp>
+        <p:nvCxnSpPr>
+          <p:cNvPr id="11" name="Conector reto 10"/>
+          <p:cNvCxnSpPr/>
+          <p:nvPr/>
+        </p:nvCxnSpPr>
+        <p:spPr>
+          <a:xfrm>
+            <a:off x="2375545" y="1151409"/>
+            <a:ext cx="0" cy="6120680"/>
+          </a:xfrm>
+          <a:prstGeom prst="line">
+            <a:avLst/>
+          </a:prstGeom>
+          <a:ln w="254000">
+            <a:solidFill>
+              <a:schemeClr val="bg1"/>
+            </a:solidFill>
+          </a:ln>
+        </p:spPr>
+        <p:style>
+          <a:lnRef idx="1">
+            <a:schemeClr val="accent1"/>
+          </a:lnRef>
+          <a:fillRef idx="0">
+            <a:schemeClr val="accent1"/>
+          </a:fillRef>
+          <a:effectRef idx="0">
+            <a:schemeClr val="accent1"/>
+          </a:effectRef>
+          <a:fontRef idx="minor">
+            <a:schemeClr val="tx1"/>
+          </a:fontRef>
+        </p:style>
+      </p:cxnSp>
+      <p:cxnSp>
+        <p:nvCxnSpPr>
+          <p:cNvPr id="12" name="Conector reto 11"/>
+          <p:cNvCxnSpPr/>
+          <p:nvPr/>
+        </p:nvCxnSpPr>
+        <p:spPr>
+          <a:xfrm>
+            <a:off x="5399881" y="1151409"/>
+            <a:ext cx="0" cy="6120680"/>
+          </a:xfrm>
+          <a:prstGeom prst="line">
+            <a:avLst/>
+          </a:prstGeom>
+          <a:ln w="254000">
+            <a:solidFill>
+              <a:schemeClr val="bg1"/>
+            </a:solidFill>
+          </a:ln>
+        </p:spPr>
+        <p:style>
+          <a:lnRef idx="1">
+            <a:schemeClr val="accent1"/>
+          </a:lnRef>
+          <a:fillRef idx="0">
+            <a:schemeClr val="accent1"/>
+          </a:fillRef>
+          <a:effectRef idx="0">
+            <a:schemeClr val="accent1"/>
+          </a:effectRef>
+          <a:fontRef idx="minor">
+            <a:schemeClr val="tx1"/>
+          </a:fontRef>
+        </p:style>
+      </p:cxnSp>
+      <p:cxnSp>
+        <p:nvCxnSpPr>
+          <p:cNvPr id="18" name="Conector reto 17"/>
+          <p:cNvCxnSpPr/>
+          <p:nvPr/>
+        </p:nvCxnSpPr>
+        <p:spPr>
+          <a:xfrm>
+            <a:off x="8424217" y="1151409"/>
+            <a:ext cx="0" cy="6120680"/>
+          </a:xfrm>
+          <a:prstGeom prst="line">
+            <a:avLst/>
+          </a:prstGeom>
+          <a:ln w="254000">
+            <a:solidFill>
+              <a:schemeClr val="bg1"/>
+            </a:solidFill>
+          </a:ln>
+        </p:spPr>
+        <p:style>
+          <a:lnRef idx="1">
+            <a:schemeClr val="accent1"/>
+          </a:lnRef>
+          <a:fillRef idx="0">
+            <a:schemeClr val="accent1"/>
+          </a:fillRef>
+          <a:effectRef idx="0">
+            <a:schemeClr val="accent1"/>
+          </a:effectRef>
+          <a:fontRef idx="minor">
+            <a:schemeClr val="tx1"/>
+          </a:fontRef>
+        </p:style>
+      </p:cxnSp>
+      <p:sp>
+        <p:nvSpPr>
+          <p:cNvPr id="19" name="Elipse 18"/>
+          <p:cNvSpPr/>
+          <p:nvPr/>
+        </p:nvSpPr>
+        <p:spPr>
+          <a:xfrm>
+            <a:off x="1799481" y="3671689"/>
+            <a:ext cx="1152128" cy="1152128"/>
+          </a:xfrm>
+          <a:prstGeom prst="ellipse">
+            <a:avLst/>
+          </a:prstGeom>
+          <a:solidFill>
+            <a:schemeClr val="bg1"/>
+          </a:solidFill>
+          <a:ln w="76200">
+            <a:solidFill>
+              <a:schemeClr val="bg1"/>
+            </a:solidFill>
+          </a:ln>
+        </p:spPr>
+        <p:style>
+          <a:lnRef idx="2">
+            <a:schemeClr val="accent1">
+              <a:shade val="50000"/>
+            </a:schemeClr>
+          </a:lnRef>
+          <a:fillRef idx="1">
+            <a:schemeClr val="accent1"/>
+          </a:fillRef>
+          <a:effectRef idx="0">
+            <a:schemeClr val="accent1"/>
+          </a:effectRef>
+          <a:fontRef idx="minor">
+            <a:schemeClr val="lt1"/>
+          </a:fontRef>
+        </p:style>
+        <p:txBody>
+          <a:bodyPr rtlCol="0" anchor="ctr"/>
+          <a:lstStyle/>
+          <a:p>
+            <a:pPr algn="ctr"/>
+            <a:endParaRPr lang="pt-BR"/>
+          </a:p>
+        </p:txBody>
+      </p:sp>
+      <p:sp>
+        <p:nvSpPr>
+          <p:cNvPr id="20" name="Elipse 19"/>
+          <p:cNvSpPr/>
+          <p:nvPr/>
+        </p:nvSpPr>
+        <p:spPr>
+          <a:xfrm>
+            <a:off x="4823817" y="5075945"/>
+            <a:ext cx="1152128" cy="1152128"/>
+          </a:xfrm>
+          <a:prstGeom prst="ellipse">
+            <a:avLst/>
+          </a:prstGeom>
+          <a:solidFill>
+            <a:schemeClr val="bg1"/>
+          </a:solidFill>
+          <a:ln w="76200">
+            <a:solidFill>
+              <a:schemeClr val="bg1"/>
+            </a:solidFill>
+          </a:ln>
+        </p:spPr>
+        <p:style>
+          <a:lnRef idx="2">
+            <a:schemeClr val="accent1">
+              <a:shade val="50000"/>
+            </a:schemeClr>
+          </a:lnRef>
+          <a:fillRef idx="1">
+            <a:schemeClr val="accent1"/>
+          </a:fillRef>
+          <a:effectRef idx="0">
+            <a:schemeClr val="accent1"/>
+          </a:effectRef>
+          <a:fontRef idx="minor">
+            <a:schemeClr val="lt1"/>
+          </a:fontRef>
+        </p:style>
+        <p:txBody>
+          <a:bodyPr rtlCol="0" anchor="ctr"/>
+          <a:lstStyle/>
+          <a:p>
+            <a:pPr algn="ctr"/>
+            <a:endParaRPr lang="pt-BR"/>
+          </a:p>
+        </p:txBody>
+      </p:sp>
+      <p:sp>
+        <p:nvSpPr>
+          <p:cNvPr id="21" name="Elipse 20"/>
+          <p:cNvSpPr/>
+          <p:nvPr/>
+        </p:nvSpPr>
+        <p:spPr>
+          <a:xfrm>
+            <a:off x="7848154" y="1727473"/>
+            <a:ext cx="1152128" cy="1152128"/>
+          </a:xfrm>
+          <a:prstGeom prst="ellipse">
+            <a:avLst/>
+          </a:prstGeom>
+          <a:solidFill>
+            <a:schemeClr val="bg1"/>
+          </a:solidFill>
+          <a:ln w="76200">
+            <a:solidFill>
+              <a:schemeClr val="bg1"/>
+            </a:solidFill>
+          </a:ln>
+        </p:spPr>
+        <p:style>
+          <a:lnRef idx="2">
+            <a:schemeClr val="accent1">
+              <a:shade val="50000"/>
+            </a:schemeClr>
+          </a:lnRef>
+          <a:fillRef idx="1">
+            <a:schemeClr val="accent1"/>
+          </a:fillRef>
+          <a:effectRef idx="0">
+            <a:schemeClr val="accent1"/>
+          </a:effectRef>
+          <a:fontRef idx="minor">
+            <a:schemeClr val="lt1"/>
+          </a:fontRef>
+        </p:style>
+        <p:txBody>
+          <a:bodyPr rtlCol="0" anchor="ctr"/>
+          <a:lstStyle/>
+          <a:p>
+            <a:pPr algn="ctr"/>
+            <a:endParaRPr lang="pt-BR"/>
+          </a:p>
+        </p:txBody>
+      </p:sp>
+    </p:spTree>
+    <p:extLst>
+      <p:ext uri="{BB962C8B-B14F-4D97-AF65-F5344CB8AC3E}">
+        <p14:creationId xmlns:p14="http://schemas.microsoft.com/office/powerpoint/2010/main" val="351420044"/>
+      </p:ext>
+    </p:extLst>
+  </p:cSld>
+  <p:clrMapOvr>
+    <a:masterClrMapping/>
+  </p:clrMapOvr>
+  <p:timing>
+    <p:tnLst>
+      <p:par>
+        <p:cTn id="1" dur="indefinite" restart="never" nodeType="tmRoot"/>
+      </p:par>
+    </p:tnLst>
+  </p:timing>
+</p:sld>
+</file>
+
+<file path=ppt/slides/slide20.xml><?xml version="1.0" encoding="utf-8"?>
 <p:sld xmlns:a="http://schemas.openxmlformats.org/drawingml/2006/main" xmlns:r="http://schemas.openxmlformats.org/officeDocument/2006/relationships" xmlns:p="http://schemas.openxmlformats.org/presentationml/2006/main">
   <p:cSld>
     <p:spTree>
@@ -7955,7 +8960,7 @@
 </p:sld>
 </file>
 
-<file path=ppt/slides/slide19.xml><?xml version="1.0" encoding="utf-8"?>
+<file path=ppt/slides/slide21.xml><?xml version="1.0" encoding="utf-8"?>
 <p:sld xmlns:a="http://schemas.openxmlformats.org/drawingml/2006/main" xmlns:r="http://schemas.openxmlformats.org/officeDocument/2006/relationships" xmlns:p="http://schemas.openxmlformats.org/presentationml/2006/main">
   <p:cSld>
     <p:spTree>
@@ -8277,432 +9282,7 @@
 </p:sld>
 </file>
 
-<file path=ppt/slides/slide2.xml><?xml version="1.0" encoding="utf-8"?>
-<p:sld xmlns:a="http://schemas.openxmlformats.org/drawingml/2006/main" xmlns:r="http://schemas.openxmlformats.org/officeDocument/2006/relationships" xmlns:p="http://schemas.openxmlformats.org/presentationml/2006/main">
-  <p:cSld>
-    <p:spTree>
-      <p:nvGrpSpPr>
-        <p:cNvPr id="1" name=""/>
-        <p:cNvGrpSpPr/>
-        <p:nvPr/>
-      </p:nvGrpSpPr>
-      <p:grpSpPr>
-        <a:xfrm>
-          <a:off x="0" y="0"/>
-          <a:ext cx="0" cy="0"/>
-          <a:chOff x="0" y="0"/>
-          <a:chExt cx="0" cy="0"/>
-        </a:xfrm>
-      </p:grpSpPr>
-      <p:sp>
-        <p:nvSpPr>
-          <p:cNvPr id="4" name="Retângulo de cantos arredondados 3"/>
-          <p:cNvSpPr/>
-          <p:nvPr/>
-        </p:nvSpPr>
-        <p:spPr>
-          <a:xfrm>
-            <a:off x="179881" y="179881"/>
-            <a:ext cx="10440000" cy="9000000"/>
-          </a:xfrm>
-          <a:prstGeom prst="roundRect">
-            <a:avLst>
-              <a:gd name="adj" fmla="val 14844"/>
-            </a:avLst>
-          </a:prstGeom>
-          <a:gradFill flip="none" rotWithShape="1">
-            <a:gsLst>
-              <a:gs pos="0">
-                <a:schemeClr val="accent4">
-                  <a:lumMod val="75000"/>
-                  <a:shade val="30000"/>
-                  <a:satMod val="115000"/>
-                </a:schemeClr>
-              </a:gs>
-              <a:gs pos="50000">
-                <a:schemeClr val="accent4">
-                  <a:lumMod val="75000"/>
-                  <a:shade val="67500"/>
-                  <a:satMod val="115000"/>
-                </a:schemeClr>
-              </a:gs>
-              <a:gs pos="100000">
-                <a:schemeClr val="accent4">
-                  <a:lumMod val="75000"/>
-                  <a:shade val="100000"/>
-                  <a:satMod val="115000"/>
-                </a:schemeClr>
-              </a:gs>
-            </a:gsLst>
-            <a:lin ang="16200000" scaled="1"/>
-            <a:tileRect/>
-          </a:gradFill>
-          <a:ln>
-            <a:noFill/>
-          </a:ln>
-          <a:effectLst/>
-        </p:spPr>
-        <p:style>
-          <a:lnRef idx="2">
-            <a:schemeClr val="accent1">
-              <a:shade val="50000"/>
-            </a:schemeClr>
-          </a:lnRef>
-          <a:fillRef idx="1">
-            <a:schemeClr val="accent1"/>
-          </a:fillRef>
-          <a:effectRef idx="0">
-            <a:schemeClr val="accent1"/>
-          </a:effectRef>
-          <a:fontRef idx="minor">
-            <a:schemeClr val="lt1"/>
-          </a:fontRef>
-        </p:style>
-        <p:txBody>
-          <a:bodyPr rtlCol="0" anchor="ctr"/>
-          <a:lstStyle/>
-          <a:p>
-            <a:pPr algn="ctr"/>
-            <a:endParaRPr lang="pt-BR" dirty="0">
-              <a:solidFill>
-                <a:prstClr val="white"/>
-              </a:solidFill>
-            </a:endParaRPr>
-          </a:p>
-        </p:txBody>
-      </p:sp>
-      <p:sp>
-        <p:nvSpPr>
-          <p:cNvPr id="13" name="Retângulo 12"/>
-          <p:cNvSpPr/>
-          <p:nvPr/>
-        </p:nvSpPr>
-        <p:spPr>
-          <a:xfrm>
-            <a:off x="179881" y="9180481"/>
-            <a:ext cx="10440000" cy="1620000"/>
-          </a:xfrm>
-          <a:prstGeom prst="rect">
-            <a:avLst/>
-          </a:prstGeom>
-          <a:noFill/>
-          <a:ln w="76200">
-            <a:noFill/>
-          </a:ln>
-        </p:spPr>
-        <p:style>
-          <a:lnRef idx="2">
-            <a:schemeClr val="accent1">
-              <a:shade val="50000"/>
-            </a:schemeClr>
-          </a:lnRef>
-          <a:fillRef idx="1">
-            <a:schemeClr val="accent1"/>
-          </a:fillRef>
-          <a:effectRef idx="0">
-            <a:schemeClr val="accent1"/>
-          </a:effectRef>
-          <a:fontRef idx="minor">
-            <a:schemeClr val="lt1"/>
-          </a:fontRef>
-        </p:style>
-        <p:txBody>
-          <a:bodyPr rtlCol="0" anchor="ctr"/>
-          <a:lstStyle/>
-          <a:p>
-            <a:pPr algn="ctr"/>
-            <a:r>
-              <a:rPr lang="pt-BR" sz="12000" b="1" dirty="0" smtClean="0">
-                <a:solidFill>
-                  <a:schemeClr val="accent4">
-                    <a:lumMod val="50000"/>
-                  </a:schemeClr>
-                </a:solidFill>
-                <a:latin typeface="Candara" pitchFamily="34" charset="0"/>
-              </a:rPr>
-              <a:t>Ajustes</a:t>
-            </a:r>
-            <a:endParaRPr lang="pt-BR" sz="12000" b="1" dirty="0">
-              <a:solidFill>
-                <a:schemeClr val="accent4">
-                  <a:lumMod val="50000"/>
-                </a:schemeClr>
-              </a:solidFill>
-              <a:latin typeface="Candara" pitchFamily="34" charset="0"/>
-            </a:endParaRPr>
-          </a:p>
-        </p:txBody>
-      </p:sp>
-      <p:cxnSp>
-        <p:nvCxnSpPr>
-          <p:cNvPr id="11" name="Conector reto 10"/>
-          <p:cNvCxnSpPr/>
-          <p:nvPr/>
-        </p:nvCxnSpPr>
-        <p:spPr>
-          <a:xfrm>
-            <a:off x="2375545" y="1151409"/>
-            <a:ext cx="0" cy="6120680"/>
-          </a:xfrm>
-          <a:prstGeom prst="line">
-            <a:avLst/>
-          </a:prstGeom>
-          <a:ln w="254000">
-            <a:solidFill>
-              <a:schemeClr val="bg1"/>
-            </a:solidFill>
-          </a:ln>
-        </p:spPr>
-        <p:style>
-          <a:lnRef idx="1">
-            <a:schemeClr val="accent1"/>
-          </a:lnRef>
-          <a:fillRef idx="0">
-            <a:schemeClr val="accent1"/>
-          </a:fillRef>
-          <a:effectRef idx="0">
-            <a:schemeClr val="accent1"/>
-          </a:effectRef>
-          <a:fontRef idx="minor">
-            <a:schemeClr val="tx1"/>
-          </a:fontRef>
-        </p:style>
-      </p:cxnSp>
-      <p:cxnSp>
-        <p:nvCxnSpPr>
-          <p:cNvPr id="12" name="Conector reto 11"/>
-          <p:cNvCxnSpPr/>
-          <p:nvPr/>
-        </p:nvCxnSpPr>
-        <p:spPr>
-          <a:xfrm>
-            <a:off x="5399881" y="1151409"/>
-            <a:ext cx="0" cy="6120680"/>
-          </a:xfrm>
-          <a:prstGeom prst="line">
-            <a:avLst/>
-          </a:prstGeom>
-          <a:ln w="254000">
-            <a:solidFill>
-              <a:schemeClr val="bg1"/>
-            </a:solidFill>
-          </a:ln>
-        </p:spPr>
-        <p:style>
-          <a:lnRef idx="1">
-            <a:schemeClr val="accent1"/>
-          </a:lnRef>
-          <a:fillRef idx="0">
-            <a:schemeClr val="accent1"/>
-          </a:fillRef>
-          <a:effectRef idx="0">
-            <a:schemeClr val="accent1"/>
-          </a:effectRef>
-          <a:fontRef idx="minor">
-            <a:schemeClr val="tx1"/>
-          </a:fontRef>
-        </p:style>
-      </p:cxnSp>
-      <p:cxnSp>
-        <p:nvCxnSpPr>
-          <p:cNvPr id="18" name="Conector reto 17"/>
-          <p:cNvCxnSpPr/>
-          <p:nvPr/>
-        </p:nvCxnSpPr>
-        <p:spPr>
-          <a:xfrm>
-            <a:off x="8424217" y="1151409"/>
-            <a:ext cx="0" cy="6120680"/>
-          </a:xfrm>
-          <a:prstGeom prst="line">
-            <a:avLst/>
-          </a:prstGeom>
-          <a:ln w="254000">
-            <a:solidFill>
-              <a:schemeClr val="bg1"/>
-            </a:solidFill>
-          </a:ln>
-        </p:spPr>
-        <p:style>
-          <a:lnRef idx="1">
-            <a:schemeClr val="accent1"/>
-          </a:lnRef>
-          <a:fillRef idx="0">
-            <a:schemeClr val="accent1"/>
-          </a:fillRef>
-          <a:effectRef idx="0">
-            <a:schemeClr val="accent1"/>
-          </a:effectRef>
-          <a:fontRef idx="minor">
-            <a:schemeClr val="tx1"/>
-          </a:fontRef>
-        </p:style>
-      </p:cxnSp>
-      <p:sp>
-        <p:nvSpPr>
-          <p:cNvPr id="19" name="Elipse 18"/>
-          <p:cNvSpPr/>
-          <p:nvPr/>
-        </p:nvSpPr>
-        <p:spPr>
-          <a:xfrm>
-            <a:off x="1799481" y="3671689"/>
-            <a:ext cx="1152128" cy="1152128"/>
-          </a:xfrm>
-          <a:prstGeom prst="ellipse">
-            <a:avLst/>
-          </a:prstGeom>
-          <a:solidFill>
-            <a:schemeClr val="bg1"/>
-          </a:solidFill>
-          <a:ln w="76200">
-            <a:solidFill>
-              <a:schemeClr val="bg1"/>
-            </a:solidFill>
-          </a:ln>
-        </p:spPr>
-        <p:style>
-          <a:lnRef idx="2">
-            <a:schemeClr val="accent1">
-              <a:shade val="50000"/>
-            </a:schemeClr>
-          </a:lnRef>
-          <a:fillRef idx="1">
-            <a:schemeClr val="accent1"/>
-          </a:fillRef>
-          <a:effectRef idx="0">
-            <a:schemeClr val="accent1"/>
-          </a:effectRef>
-          <a:fontRef idx="minor">
-            <a:schemeClr val="lt1"/>
-          </a:fontRef>
-        </p:style>
-        <p:txBody>
-          <a:bodyPr rtlCol="0" anchor="ctr"/>
-          <a:lstStyle/>
-          <a:p>
-            <a:pPr algn="ctr"/>
-            <a:endParaRPr lang="pt-BR"/>
-          </a:p>
-        </p:txBody>
-      </p:sp>
-      <p:sp>
-        <p:nvSpPr>
-          <p:cNvPr id="20" name="Elipse 19"/>
-          <p:cNvSpPr/>
-          <p:nvPr/>
-        </p:nvSpPr>
-        <p:spPr>
-          <a:xfrm>
-            <a:off x="4823817" y="5075945"/>
-            <a:ext cx="1152128" cy="1152128"/>
-          </a:xfrm>
-          <a:prstGeom prst="ellipse">
-            <a:avLst/>
-          </a:prstGeom>
-          <a:solidFill>
-            <a:schemeClr val="bg1"/>
-          </a:solidFill>
-          <a:ln w="76200">
-            <a:solidFill>
-              <a:schemeClr val="bg1"/>
-            </a:solidFill>
-          </a:ln>
-        </p:spPr>
-        <p:style>
-          <a:lnRef idx="2">
-            <a:schemeClr val="accent1">
-              <a:shade val="50000"/>
-            </a:schemeClr>
-          </a:lnRef>
-          <a:fillRef idx="1">
-            <a:schemeClr val="accent1"/>
-          </a:fillRef>
-          <a:effectRef idx="0">
-            <a:schemeClr val="accent1"/>
-          </a:effectRef>
-          <a:fontRef idx="minor">
-            <a:schemeClr val="lt1"/>
-          </a:fontRef>
-        </p:style>
-        <p:txBody>
-          <a:bodyPr rtlCol="0" anchor="ctr"/>
-          <a:lstStyle/>
-          <a:p>
-            <a:pPr algn="ctr"/>
-            <a:endParaRPr lang="pt-BR"/>
-          </a:p>
-        </p:txBody>
-      </p:sp>
-      <p:sp>
-        <p:nvSpPr>
-          <p:cNvPr id="21" name="Elipse 20"/>
-          <p:cNvSpPr/>
-          <p:nvPr/>
-        </p:nvSpPr>
-        <p:spPr>
-          <a:xfrm>
-            <a:off x="7848154" y="1727473"/>
-            <a:ext cx="1152128" cy="1152128"/>
-          </a:xfrm>
-          <a:prstGeom prst="ellipse">
-            <a:avLst/>
-          </a:prstGeom>
-          <a:solidFill>
-            <a:schemeClr val="bg1"/>
-          </a:solidFill>
-          <a:ln w="76200">
-            <a:solidFill>
-              <a:schemeClr val="bg1"/>
-            </a:solidFill>
-          </a:ln>
-        </p:spPr>
-        <p:style>
-          <a:lnRef idx="2">
-            <a:schemeClr val="accent1">
-              <a:shade val="50000"/>
-            </a:schemeClr>
-          </a:lnRef>
-          <a:fillRef idx="1">
-            <a:schemeClr val="accent1"/>
-          </a:fillRef>
-          <a:effectRef idx="0">
-            <a:schemeClr val="accent1"/>
-          </a:effectRef>
-          <a:fontRef idx="minor">
-            <a:schemeClr val="lt1"/>
-          </a:fontRef>
-        </p:style>
-        <p:txBody>
-          <a:bodyPr rtlCol="0" anchor="ctr"/>
-          <a:lstStyle/>
-          <a:p>
-            <a:pPr algn="ctr"/>
-            <a:endParaRPr lang="pt-BR"/>
-          </a:p>
-        </p:txBody>
-      </p:sp>
-    </p:spTree>
-    <p:extLst>
-      <p:ext uri="{BB962C8B-B14F-4D97-AF65-F5344CB8AC3E}">
-        <p14:creationId xmlns:p14="http://schemas.microsoft.com/office/powerpoint/2010/main" val="351420044"/>
-      </p:ext>
-    </p:extLst>
-  </p:cSld>
-  <p:clrMapOvr>
-    <a:masterClrMapping/>
-  </p:clrMapOvr>
-  <p:timing>
-    <p:tnLst>
-      <p:par>
-        <p:cTn id="1" dur="indefinite" restart="never" nodeType="tmRoot"/>
-      </p:par>
-    </p:tnLst>
-  </p:timing>
-</p:sld>
-</file>
-
-<file path=ppt/slides/slide20.xml><?xml version="1.0" encoding="utf-8"?>
+<file path=ppt/slides/slide22.xml><?xml version="1.0" encoding="utf-8"?>
 <p:sld xmlns:a="http://schemas.openxmlformats.org/drawingml/2006/main" xmlns:r="http://schemas.openxmlformats.org/officeDocument/2006/relationships" xmlns:p="http://schemas.openxmlformats.org/presentationml/2006/main">
   <p:cSld>
     <p:spTree>
@@ -9652,7 +10232,7 @@
 </p:sld>
 </file>
 
-<file path=ppt/slides/slide21.xml><?xml version="1.0" encoding="utf-8"?>
+<file path=ppt/slides/slide23.xml><?xml version="1.0" encoding="utf-8"?>
 <p:sld xmlns:a="http://schemas.openxmlformats.org/drawingml/2006/main" xmlns:r="http://schemas.openxmlformats.org/officeDocument/2006/relationships" xmlns:p="http://schemas.openxmlformats.org/presentationml/2006/main">
   <p:cSld>
     <p:spTree>
@@ -10106,7 +10686,7 @@
 </p:sld>
 </file>
 
-<file path=ppt/slides/slide22.xml><?xml version="1.0" encoding="utf-8"?>
+<file path=ppt/slides/slide24.xml><?xml version="1.0" encoding="utf-8"?>
 <p:sld xmlns:a="http://schemas.openxmlformats.org/drawingml/2006/main" xmlns:r="http://schemas.openxmlformats.org/officeDocument/2006/relationships" xmlns:p="http://schemas.openxmlformats.org/presentationml/2006/main">
   <p:cSld>
     <p:spTree>
@@ -11645,7 +12225,7 @@
 </p:sld>
 </file>
 
-<file path=ppt/slides/slide23.xml><?xml version="1.0" encoding="utf-8"?>
+<file path=ppt/slides/slide25.xml><?xml version="1.0" encoding="utf-8"?>
 <p:sld xmlns:a="http://schemas.openxmlformats.org/drawingml/2006/main" xmlns:r="http://schemas.openxmlformats.org/officeDocument/2006/relationships" xmlns:p="http://schemas.openxmlformats.org/presentationml/2006/main">
   <p:cSld>
     <p:spTree>
@@ -12165,7 +12745,7 @@
 </p:sld>
 </file>
 
-<file path=ppt/slides/slide24.xml><?xml version="1.0" encoding="utf-8"?>
+<file path=ppt/slides/slide26.xml><?xml version="1.0" encoding="utf-8"?>
 <p:sld xmlns:a="http://schemas.openxmlformats.org/drawingml/2006/main" xmlns:r="http://schemas.openxmlformats.org/officeDocument/2006/relationships" xmlns:p="http://schemas.openxmlformats.org/presentationml/2006/main">
   <p:cSld>
     <p:spTree>
@@ -12414,7 +12994,186 @@
 </p:sld>
 </file>
 
-<file path=ppt/slides/slide25.xml><?xml version="1.0" encoding="utf-8"?>
+<file path=ppt/slides/slide27.xml><?xml version="1.0" encoding="utf-8"?>
+<p:sld xmlns:a="http://schemas.openxmlformats.org/drawingml/2006/main" xmlns:r="http://schemas.openxmlformats.org/officeDocument/2006/relationships" xmlns:p="http://schemas.openxmlformats.org/presentationml/2006/main">
+  <p:cSld>
+    <p:spTree>
+      <p:nvGrpSpPr>
+        <p:cNvPr id="1" name=""/>
+        <p:cNvGrpSpPr/>
+        <p:nvPr/>
+      </p:nvGrpSpPr>
+      <p:grpSpPr>
+        <a:xfrm>
+          <a:off x="0" y="0"/>
+          <a:ext cx="0" cy="0"/>
+          <a:chOff x="0" y="0"/>
+          <a:chExt cx="0" cy="0"/>
+        </a:xfrm>
+      </p:grpSpPr>
+      <p:sp>
+        <p:nvSpPr>
+          <p:cNvPr id="2" name="Retângulo de cantos arredondados 1"/>
+          <p:cNvSpPr/>
+          <p:nvPr/>
+        </p:nvSpPr>
+        <p:spPr>
+          <a:xfrm>
+            <a:off x="179881" y="6624017"/>
+            <a:ext cx="7073916" cy="3960158"/>
+          </a:xfrm>
+          <a:prstGeom prst="roundRect">
+            <a:avLst>
+              <a:gd name="adj" fmla="val 50000"/>
+            </a:avLst>
+          </a:prstGeom>
+          <a:solidFill>
+            <a:srgbClr val="3399FF"/>
+          </a:solidFill>
+          <a:ln w="76200">
+            <a:noFill/>
+          </a:ln>
+        </p:spPr>
+        <p:style>
+          <a:lnRef idx="2">
+            <a:schemeClr val="accent1">
+              <a:shade val="50000"/>
+            </a:schemeClr>
+          </a:lnRef>
+          <a:fillRef idx="1">
+            <a:schemeClr val="accent1"/>
+          </a:fillRef>
+          <a:effectRef idx="0">
+            <a:schemeClr val="accent1"/>
+          </a:effectRef>
+          <a:fontRef idx="minor">
+            <a:schemeClr val="lt1"/>
+          </a:fontRef>
+        </p:style>
+        <p:txBody>
+          <a:bodyPr rtlCol="0" anchor="ctr"/>
+          <a:lstStyle/>
+          <a:p>
+            <a:pPr algn="ctr"/>
+            <a:endParaRPr lang="pt-BR"/>
+          </a:p>
+        </p:txBody>
+      </p:sp>
+      <p:sp>
+        <p:nvSpPr>
+          <p:cNvPr id="11" name="Elipse 10"/>
+          <p:cNvSpPr/>
+          <p:nvPr/>
+        </p:nvSpPr>
+        <p:spPr>
+          <a:xfrm>
+            <a:off x="2231529" y="4103737"/>
+            <a:ext cx="6768752" cy="6454432"/>
+          </a:xfrm>
+          <a:prstGeom prst="ellipse">
+            <a:avLst/>
+          </a:prstGeom>
+          <a:solidFill>
+            <a:srgbClr val="3399FF"/>
+          </a:solidFill>
+          <a:ln w="76200">
+            <a:noFill/>
+          </a:ln>
+        </p:spPr>
+        <p:style>
+          <a:lnRef idx="2">
+            <a:schemeClr val="accent1">
+              <a:shade val="50000"/>
+            </a:schemeClr>
+          </a:lnRef>
+          <a:fillRef idx="1">
+            <a:schemeClr val="accent1"/>
+          </a:fillRef>
+          <a:effectRef idx="0">
+            <a:schemeClr val="accent1"/>
+          </a:effectRef>
+          <a:fontRef idx="minor">
+            <a:schemeClr val="lt1"/>
+          </a:fontRef>
+        </p:style>
+        <p:txBody>
+          <a:bodyPr rtlCol="0" anchor="ctr"/>
+          <a:lstStyle/>
+          <a:p>
+            <a:pPr algn="ctr"/>
+            <a:endParaRPr lang="pt-BR" dirty="0"/>
+          </a:p>
+        </p:txBody>
+      </p:sp>
+      <p:sp>
+        <p:nvSpPr>
+          <p:cNvPr id="13" name="Retângulo de cantos arredondados 12"/>
+          <p:cNvSpPr/>
+          <p:nvPr/>
+        </p:nvSpPr>
+        <p:spPr>
+          <a:xfrm>
+            <a:off x="3887713" y="7200081"/>
+            <a:ext cx="6732168" cy="3384094"/>
+          </a:xfrm>
+          <a:prstGeom prst="roundRect">
+            <a:avLst>
+              <a:gd name="adj" fmla="val 50000"/>
+            </a:avLst>
+          </a:prstGeom>
+          <a:solidFill>
+            <a:srgbClr val="3399FF"/>
+          </a:solidFill>
+          <a:ln w="76200">
+            <a:noFill/>
+          </a:ln>
+        </p:spPr>
+        <p:style>
+          <a:lnRef idx="2">
+            <a:schemeClr val="accent1">
+              <a:shade val="50000"/>
+            </a:schemeClr>
+          </a:lnRef>
+          <a:fillRef idx="1">
+            <a:schemeClr val="accent1"/>
+          </a:fillRef>
+          <a:effectRef idx="0">
+            <a:schemeClr val="accent1"/>
+          </a:effectRef>
+          <a:fontRef idx="minor">
+            <a:schemeClr val="lt1"/>
+          </a:fontRef>
+        </p:style>
+        <p:txBody>
+          <a:bodyPr rtlCol="0" anchor="ctr"/>
+          <a:lstStyle/>
+          <a:p>
+            <a:pPr algn="ctr"/>
+            <a:endParaRPr lang="pt-BR"/>
+          </a:p>
+        </p:txBody>
+      </p:sp>
+    </p:spTree>
+    <p:extLst>
+      <p:ext uri="{BB962C8B-B14F-4D97-AF65-F5344CB8AC3E}">
+        <p14:creationId xmlns:p14="http://schemas.microsoft.com/office/powerpoint/2010/main" val="3154229452"/>
+      </p:ext>
+    </p:extLst>
+  </p:cSld>
+  <p:clrMapOvr>
+    <a:masterClrMapping/>
+  </p:clrMapOvr>
+  <p:timing>
+    <p:tnLst>
+      <p:par>
+        <p:cTn id="1" dur="indefinite" restart="never" nodeType="tmRoot"/>
+      </p:par>
+    </p:tnLst>
+  </p:timing>
+</p:sld>
+</file>
+
+<file path=ppt/slides/slide28.xml><?xml version="1.0" encoding="utf-8"?>
 <p:sld xmlns:a="http://schemas.openxmlformats.org/drawingml/2006/main" xmlns:r="http://schemas.openxmlformats.org/officeDocument/2006/relationships" xmlns:p="http://schemas.openxmlformats.org/presentationml/2006/main">
   <p:cSld>
     <p:spTree>
@@ -12580,7 +13339,7 @@
 </p:sld>
 </file>
 
-<file path=ppt/slides/slide26.xml><?xml version="1.0" encoding="utf-8"?>
+<file path=ppt/slides/slide29.xml><?xml version="1.0" encoding="utf-8"?>
 <p:sld xmlns:a="http://schemas.openxmlformats.org/drawingml/2006/main" xmlns:r="http://schemas.openxmlformats.org/officeDocument/2006/relationships" xmlns:p="http://schemas.openxmlformats.org/presentationml/2006/main">
   <p:cSld>
     <p:spTree>
@@ -13601,438 +14360,357 @@
           </a:p>
         </p:txBody>
       </p:sp>
-      <p:sp>
-        <p:nvSpPr>
-          <p:cNvPr id="2" name="Retângulo 1"/>
-          <p:cNvSpPr/>
-          <p:nvPr/>
-        </p:nvSpPr>
-        <p:spPr>
-          <a:xfrm>
-            <a:off x="7937422" y="2087513"/>
-            <a:ext cx="1080120" cy="4752528"/>
-          </a:xfrm>
-          <a:prstGeom prst="rect">
-            <a:avLst/>
-          </a:prstGeom>
-          <a:solidFill>
-            <a:schemeClr val="bg1"/>
-          </a:solidFill>
-          <a:ln w="76200">
+      <p:grpSp>
+        <p:nvGrpSpPr>
+          <p:cNvPr id="3" name="Grupo 2"/>
+          <p:cNvGrpSpPr/>
+          <p:nvPr/>
+        </p:nvGrpSpPr>
+        <p:grpSpPr>
+          <a:xfrm>
+            <a:off x="2786057" y="1079401"/>
+            <a:ext cx="5227648" cy="6552728"/>
+            <a:chOff x="3789894" y="1079401"/>
+            <a:chExt cx="5227648" cy="6552728"/>
+          </a:xfrm>
+        </p:grpSpPr>
+        <p:sp>
+          <p:nvSpPr>
+            <p:cNvPr id="2" name="Retângulo 1"/>
+            <p:cNvSpPr/>
+            <p:nvPr/>
+          </p:nvSpPr>
+          <p:spPr>
+            <a:xfrm>
+              <a:off x="7937422" y="2087513"/>
+              <a:ext cx="1080120" cy="4752528"/>
+            </a:xfrm>
+            <a:prstGeom prst="rect">
+              <a:avLst/>
+            </a:prstGeom>
             <a:solidFill>
               <a:schemeClr val="bg1"/>
             </a:solidFill>
-          </a:ln>
-        </p:spPr>
-        <p:style>
-          <a:lnRef idx="2">
-            <a:schemeClr val="accent1">
-              <a:shade val="50000"/>
-            </a:schemeClr>
-          </a:lnRef>
-          <a:fillRef idx="1">
-            <a:schemeClr val="accent1"/>
-          </a:fillRef>
-          <a:effectRef idx="0">
-            <a:schemeClr val="accent1"/>
-          </a:effectRef>
-          <a:fontRef idx="minor">
-            <a:schemeClr val="lt1"/>
-          </a:fontRef>
-        </p:style>
-        <p:txBody>
-          <a:bodyPr rtlCol="0" anchor="ctr"/>
-          <a:lstStyle/>
-          <a:p>
-            <a:pPr algn="ctr"/>
-            <a:endParaRPr lang="pt-BR"/>
-          </a:p>
-        </p:txBody>
-      </p:sp>
-      <p:sp>
-        <p:nvSpPr>
-          <p:cNvPr id="5" name="Triângulo retângulo 4"/>
-          <p:cNvSpPr/>
-          <p:nvPr/>
-        </p:nvSpPr>
-        <p:spPr>
-          <a:xfrm>
-            <a:off x="1716130" y="2591569"/>
-            <a:ext cx="2160000" cy="2160000"/>
-          </a:xfrm>
-          <a:prstGeom prst="rtTriangle">
-            <a:avLst/>
-          </a:prstGeom>
-          <a:solidFill>
-            <a:schemeClr val="bg1"/>
-          </a:solidFill>
-          <a:ln w="76200">
+            <a:ln w="76200">
+              <a:solidFill>
+                <a:schemeClr val="bg1"/>
+              </a:solidFill>
+            </a:ln>
+          </p:spPr>
+          <p:style>
+            <a:lnRef idx="2">
+              <a:schemeClr val="accent1">
+                <a:shade val="50000"/>
+              </a:schemeClr>
+            </a:lnRef>
+            <a:fillRef idx="1">
+              <a:schemeClr val="accent1"/>
+            </a:fillRef>
+            <a:effectRef idx="0">
+              <a:schemeClr val="accent1"/>
+            </a:effectRef>
+            <a:fontRef idx="minor">
+              <a:schemeClr val="lt1"/>
+            </a:fontRef>
+          </p:style>
+          <p:txBody>
+            <a:bodyPr rtlCol="0" anchor="ctr"/>
+            <a:lstStyle/>
+            <a:p>
+              <a:pPr algn="ctr"/>
+              <a:endParaRPr lang="pt-BR"/>
+            </a:p>
+          </p:txBody>
+        </p:sp>
+        <p:sp>
+          <p:nvSpPr>
+            <p:cNvPr id="16" name="Triângulo retângulo 15"/>
+            <p:cNvSpPr/>
+            <p:nvPr/>
+          </p:nvSpPr>
+          <p:spPr>
+            <a:xfrm>
+              <a:off x="3789894" y="2591569"/>
+              <a:ext cx="2160000" cy="2160000"/>
+            </a:xfrm>
+            <a:prstGeom prst="rtTriangle">
+              <a:avLst/>
+            </a:prstGeom>
             <a:solidFill>
               <a:schemeClr val="bg1"/>
             </a:solidFill>
-          </a:ln>
-        </p:spPr>
-        <p:style>
-          <a:lnRef idx="2">
-            <a:schemeClr val="accent1">
-              <a:shade val="50000"/>
-            </a:schemeClr>
-          </a:lnRef>
-          <a:fillRef idx="1">
-            <a:schemeClr val="accent1"/>
-          </a:fillRef>
-          <a:effectRef idx="0">
-            <a:schemeClr val="accent1"/>
-          </a:effectRef>
-          <a:fontRef idx="minor">
-            <a:schemeClr val="lt1"/>
-          </a:fontRef>
-        </p:style>
-        <p:txBody>
-          <a:bodyPr rtlCol="0" anchor="ctr"/>
-          <a:lstStyle/>
-          <a:p>
-            <a:pPr algn="ctr"/>
-            <a:endParaRPr lang="pt-BR"/>
-          </a:p>
-        </p:txBody>
-      </p:sp>
-      <p:sp>
-        <p:nvSpPr>
-          <p:cNvPr id="16" name="Triângulo retângulo 15"/>
-          <p:cNvSpPr/>
-          <p:nvPr/>
-        </p:nvSpPr>
-        <p:spPr>
-          <a:xfrm>
-            <a:off x="3789894" y="2591569"/>
-            <a:ext cx="2160000" cy="2160000"/>
-          </a:xfrm>
-          <a:prstGeom prst="rtTriangle">
-            <a:avLst/>
-          </a:prstGeom>
-          <a:solidFill>
-            <a:schemeClr val="bg1"/>
-          </a:solidFill>
-          <a:ln w="76200">
+            <a:ln w="76200">
+              <a:solidFill>
+                <a:schemeClr val="bg1"/>
+              </a:solidFill>
+            </a:ln>
+          </p:spPr>
+          <p:style>
+            <a:lnRef idx="2">
+              <a:schemeClr val="accent1">
+                <a:shade val="50000"/>
+              </a:schemeClr>
+            </a:lnRef>
+            <a:fillRef idx="1">
+              <a:schemeClr val="accent1"/>
+            </a:fillRef>
+            <a:effectRef idx="0">
+              <a:schemeClr val="accent1"/>
+            </a:effectRef>
+            <a:fontRef idx="minor">
+              <a:schemeClr val="lt1"/>
+            </a:fontRef>
+          </p:style>
+          <p:txBody>
+            <a:bodyPr rtlCol="0" anchor="ctr"/>
+            <a:lstStyle/>
+            <a:p>
+              <a:pPr algn="ctr"/>
+              <a:endParaRPr lang="pt-BR"/>
+            </a:p>
+          </p:txBody>
+        </p:sp>
+        <p:sp>
+          <p:nvSpPr>
+            <p:cNvPr id="17" name="Triângulo retângulo 16"/>
+            <p:cNvSpPr/>
+            <p:nvPr/>
+          </p:nvSpPr>
+          <p:spPr>
+            <a:xfrm>
+              <a:off x="5863658" y="2591569"/>
+              <a:ext cx="2160000" cy="2160000"/>
+            </a:xfrm>
+            <a:prstGeom prst="rtTriangle">
+              <a:avLst/>
+            </a:prstGeom>
             <a:solidFill>
               <a:schemeClr val="bg1"/>
             </a:solidFill>
-          </a:ln>
-        </p:spPr>
-        <p:style>
-          <a:lnRef idx="2">
-            <a:schemeClr val="accent1">
-              <a:shade val="50000"/>
-            </a:schemeClr>
-          </a:lnRef>
-          <a:fillRef idx="1">
-            <a:schemeClr val="accent1"/>
-          </a:fillRef>
-          <a:effectRef idx="0">
-            <a:schemeClr val="accent1"/>
-          </a:effectRef>
-          <a:fontRef idx="minor">
-            <a:schemeClr val="lt1"/>
-          </a:fontRef>
-        </p:style>
-        <p:txBody>
-          <a:bodyPr rtlCol="0" anchor="ctr"/>
-          <a:lstStyle/>
-          <a:p>
-            <a:pPr algn="ctr"/>
-            <a:endParaRPr lang="pt-BR"/>
-          </a:p>
-        </p:txBody>
-      </p:sp>
-      <p:sp>
-        <p:nvSpPr>
-          <p:cNvPr id="17" name="Triângulo retângulo 16"/>
-          <p:cNvSpPr/>
-          <p:nvPr/>
-        </p:nvSpPr>
-        <p:spPr>
-          <a:xfrm>
-            <a:off x="5863658" y="2591569"/>
-            <a:ext cx="2160000" cy="2160000"/>
-          </a:xfrm>
-          <a:prstGeom prst="rtTriangle">
-            <a:avLst/>
-          </a:prstGeom>
-          <a:solidFill>
-            <a:schemeClr val="bg1"/>
-          </a:solidFill>
-          <a:ln w="76200">
+            <a:ln w="76200">
+              <a:solidFill>
+                <a:schemeClr val="bg1"/>
+              </a:solidFill>
+            </a:ln>
+          </p:spPr>
+          <p:style>
+            <a:lnRef idx="2">
+              <a:schemeClr val="accent1">
+                <a:shade val="50000"/>
+              </a:schemeClr>
+            </a:lnRef>
+            <a:fillRef idx="1">
+              <a:schemeClr val="accent1"/>
+            </a:fillRef>
+            <a:effectRef idx="0">
+              <a:schemeClr val="accent1"/>
+            </a:effectRef>
+            <a:fontRef idx="minor">
+              <a:schemeClr val="lt1"/>
+            </a:fontRef>
+          </p:style>
+          <p:txBody>
+            <a:bodyPr rtlCol="0" anchor="ctr"/>
+            <a:lstStyle/>
+            <a:p>
+              <a:pPr algn="ctr"/>
+              <a:endParaRPr lang="pt-BR"/>
+            </a:p>
+          </p:txBody>
+        </p:sp>
+        <p:sp>
+          <p:nvSpPr>
+            <p:cNvPr id="22" name="Retângulo 21"/>
+            <p:cNvSpPr/>
+            <p:nvPr/>
+          </p:nvSpPr>
+          <p:spPr>
+            <a:xfrm>
+              <a:off x="3789894" y="4751569"/>
+              <a:ext cx="5227648" cy="2880560"/>
+            </a:xfrm>
+            <a:prstGeom prst="rect">
+              <a:avLst/>
+            </a:prstGeom>
             <a:solidFill>
               <a:schemeClr val="bg1"/>
             </a:solidFill>
-          </a:ln>
-        </p:spPr>
-        <p:style>
-          <a:lnRef idx="2">
-            <a:schemeClr val="accent1">
-              <a:shade val="50000"/>
-            </a:schemeClr>
-          </a:lnRef>
-          <a:fillRef idx="1">
-            <a:schemeClr val="accent1"/>
-          </a:fillRef>
-          <a:effectRef idx="0">
-            <a:schemeClr val="accent1"/>
-          </a:effectRef>
-          <a:fontRef idx="minor">
-            <a:schemeClr val="lt1"/>
-          </a:fontRef>
-        </p:style>
-        <p:txBody>
-          <a:bodyPr rtlCol="0" anchor="ctr"/>
-          <a:lstStyle/>
-          <a:p>
-            <a:pPr algn="ctr"/>
-            <a:endParaRPr lang="pt-BR"/>
-          </a:p>
-        </p:txBody>
-      </p:sp>
-      <p:sp>
-        <p:nvSpPr>
-          <p:cNvPr id="22" name="Retângulo 21"/>
-          <p:cNvSpPr/>
-          <p:nvPr/>
-        </p:nvSpPr>
-        <p:spPr>
-          <a:xfrm>
-            <a:off x="1716130" y="4751569"/>
-            <a:ext cx="7301412" cy="2880560"/>
-          </a:xfrm>
-          <a:prstGeom prst="rect">
-            <a:avLst/>
-          </a:prstGeom>
-          <a:solidFill>
-            <a:schemeClr val="bg1"/>
-          </a:solidFill>
-          <a:ln w="76200">
+            <a:ln w="76200">
+              <a:solidFill>
+                <a:schemeClr val="bg1"/>
+              </a:solidFill>
+            </a:ln>
+          </p:spPr>
+          <p:style>
+            <a:lnRef idx="2">
+              <a:schemeClr val="accent1">
+                <a:shade val="50000"/>
+              </a:schemeClr>
+            </a:lnRef>
+            <a:fillRef idx="1">
+              <a:schemeClr val="accent1"/>
+            </a:fillRef>
+            <a:effectRef idx="0">
+              <a:schemeClr val="accent1"/>
+            </a:effectRef>
+            <a:fontRef idx="minor">
+              <a:schemeClr val="lt1"/>
+            </a:fontRef>
+          </p:style>
+          <p:txBody>
+            <a:bodyPr rtlCol="0" anchor="ctr"/>
+            <a:lstStyle/>
+            <a:p>
+              <a:pPr algn="ctr"/>
+              <a:endParaRPr lang="pt-BR"/>
+            </a:p>
+          </p:txBody>
+        </p:sp>
+        <p:sp>
+          <p:nvSpPr>
+            <p:cNvPr id="6" name="Arredondar Retângulo no Mesmo Canto Lateral 5"/>
+            <p:cNvSpPr/>
+            <p:nvPr/>
+          </p:nvSpPr>
+          <p:spPr>
+            <a:xfrm>
+              <a:off x="7937422" y="1079401"/>
+              <a:ext cx="1080000" cy="720000"/>
+            </a:xfrm>
+            <a:prstGeom prst="round2SameRect">
+              <a:avLst/>
+            </a:prstGeom>
             <a:solidFill>
               <a:schemeClr val="bg1"/>
             </a:solidFill>
-          </a:ln>
-        </p:spPr>
-        <p:style>
-          <a:lnRef idx="2">
-            <a:schemeClr val="accent1">
-              <a:shade val="50000"/>
-            </a:schemeClr>
-          </a:lnRef>
-          <a:fillRef idx="1">
-            <a:schemeClr val="accent1"/>
-          </a:fillRef>
-          <a:effectRef idx="0">
-            <a:schemeClr val="accent1"/>
-          </a:effectRef>
-          <a:fontRef idx="minor">
-            <a:schemeClr val="lt1"/>
-          </a:fontRef>
-        </p:style>
-        <p:txBody>
-          <a:bodyPr rtlCol="0" anchor="ctr"/>
-          <a:lstStyle/>
-          <a:p>
-            <a:pPr algn="ctr"/>
-            <a:endParaRPr lang="pt-BR"/>
-          </a:p>
-        </p:txBody>
-      </p:sp>
-      <p:sp>
-        <p:nvSpPr>
-          <p:cNvPr id="6" name="Arredondar Retângulo no Mesmo Canto Lateral 5"/>
-          <p:cNvSpPr/>
-          <p:nvPr/>
-        </p:nvSpPr>
-        <p:spPr>
-          <a:xfrm>
-            <a:off x="7937422" y="1079401"/>
-            <a:ext cx="1080000" cy="720000"/>
-          </a:xfrm>
-          <a:prstGeom prst="round2SameRect">
-            <a:avLst/>
-          </a:prstGeom>
-          <a:solidFill>
-            <a:schemeClr val="bg1"/>
-          </a:solidFill>
-          <a:ln w="76200">
+            <a:ln w="76200">
+              <a:solidFill>
+                <a:schemeClr val="bg1"/>
+              </a:solidFill>
+            </a:ln>
+          </p:spPr>
+          <p:style>
+            <a:lnRef idx="2">
+              <a:schemeClr val="accent1">
+                <a:shade val="50000"/>
+              </a:schemeClr>
+            </a:lnRef>
+            <a:fillRef idx="1">
+              <a:schemeClr val="accent1"/>
+            </a:fillRef>
+            <a:effectRef idx="0">
+              <a:schemeClr val="accent1"/>
+            </a:effectRef>
+            <a:fontRef idx="minor">
+              <a:schemeClr val="lt1"/>
+            </a:fontRef>
+          </p:style>
+          <p:txBody>
+            <a:bodyPr rtlCol="0" anchor="ctr"/>
+            <a:lstStyle/>
+            <a:p>
+              <a:pPr algn="ctr"/>
+              <a:endParaRPr lang="pt-BR"/>
+            </a:p>
+          </p:txBody>
+        </p:sp>
+        <p:sp>
+          <p:nvSpPr>
+            <p:cNvPr id="24" name="Retângulo 23"/>
+            <p:cNvSpPr/>
+            <p:nvPr/>
+          </p:nvSpPr>
+          <p:spPr>
+            <a:xfrm>
+              <a:off x="4365758" y="5328033"/>
+              <a:ext cx="1260000" cy="1620000"/>
+            </a:xfrm>
+            <a:prstGeom prst="rect">
+              <a:avLst/>
+            </a:prstGeom>
             <a:solidFill>
-              <a:schemeClr val="bg1"/>
+              <a:schemeClr val="accent2"/>
             </a:solidFill>
-          </a:ln>
-        </p:spPr>
-        <p:style>
-          <a:lnRef idx="2">
-            <a:schemeClr val="accent1">
-              <a:shade val="50000"/>
-            </a:schemeClr>
-          </a:lnRef>
-          <a:fillRef idx="1">
-            <a:schemeClr val="accent1"/>
-          </a:fillRef>
-          <a:effectRef idx="0">
-            <a:schemeClr val="accent1"/>
-          </a:effectRef>
-          <a:fontRef idx="minor">
-            <a:schemeClr val="lt1"/>
-          </a:fontRef>
-        </p:style>
-        <p:txBody>
-          <a:bodyPr rtlCol="0" anchor="ctr"/>
-          <a:lstStyle/>
-          <a:p>
-            <a:pPr algn="ctr"/>
-            <a:endParaRPr lang="pt-BR"/>
-          </a:p>
-        </p:txBody>
-      </p:sp>
-      <p:sp>
-        <p:nvSpPr>
-          <p:cNvPr id="7" name="Retângulo 6"/>
-          <p:cNvSpPr/>
-          <p:nvPr/>
-        </p:nvSpPr>
-        <p:spPr>
-          <a:xfrm>
-            <a:off x="2291994" y="5328033"/>
-            <a:ext cx="1260000" cy="1620000"/>
-          </a:xfrm>
-          <a:prstGeom prst="rect">
-            <a:avLst/>
-          </a:prstGeom>
-          <a:solidFill>
-            <a:schemeClr val="accent2"/>
-          </a:solidFill>
-          <a:ln w="76200">
+            <a:ln w="76200">
+              <a:solidFill>
+                <a:schemeClr val="bg1"/>
+              </a:solidFill>
+            </a:ln>
+          </p:spPr>
+          <p:style>
+            <a:lnRef idx="2">
+              <a:schemeClr val="accent1">
+                <a:shade val="50000"/>
+              </a:schemeClr>
+            </a:lnRef>
+            <a:fillRef idx="1">
+              <a:schemeClr val="accent1"/>
+            </a:fillRef>
+            <a:effectRef idx="0">
+              <a:schemeClr val="accent1"/>
+            </a:effectRef>
+            <a:fontRef idx="minor">
+              <a:schemeClr val="lt1"/>
+            </a:fontRef>
+          </p:style>
+          <p:txBody>
+            <a:bodyPr rtlCol="0" anchor="ctr"/>
+            <a:lstStyle/>
+            <a:p>
+              <a:pPr algn="ctr"/>
+              <a:endParaRPr lang="pt-BR"/>
+            </a:p>
+          </p:txBody>
+        </p:sp>
+        <p:sp>
+          <p:nvSpPr>
+            <p:cNvPr id="25" name="Retângulo 24"/>
+            <p:cNvSpPr/>
+            <p:nvPr/>
+          </p:nvSpPr>
+          <p:spPr>
+            <a:xfrm>
+              <a:off x="6439522" y="5328033"/>
+              <a:ext cx="1260000" cy="1620000"/>
+            </a:xfrm>
+            <a:prstGeom prst="rect">
+              <a:avLst/>
+            </a:prstGeom>
             <a:solidFill>
-              <a:schemeClr val="bg1"/>
+              <a:schemeClr val="accent2"/>
             </a:solidFill>
-          </a:ln>
-        </p:spPr>
-        <p:style>
-          <a:lnRef idx="2">
-            <a:schemeClr val="accent1">
-              <a:shade val="50000"/>
-            </a:schemeClr>
-          </a:lnRef>
-          <a:fillRef idx="1">
-            <a:schemeClr val="accent1"/>
-          </a:fillRef>
-          <a:effectRef idx="0">
-            <a:schemeClr val="accent1"/>
-          </a:effectRef>
-          <a:fontRef idx="minor">
-            <a:schemeClr val="lt1"/>
-          </a:fontRef>
-        </p:style>
-        <p:txBody>
-          <a:bodyPr rtlCol="0" anchor="ctr"/>
-          <a:lstStyle/>
-          <a:p>
-            <a:pPr algn="ctr"/>
-            <a:endParaRPr lang="pt-BR"/>
-          </a:p>
-        </p:txBody>
-      </p:sp>
-      <p:sp>
-        <p:nvSpPr>
-          <p:cNvPr id="24" name="Retângulo 23"/>
-          <p:cNvSpPr/>
-          <p:nvPr/>
-        </p:nvSpPr>
-        <p:spPr>
-          <a:xfrm>
-            <a:off x="4365758" y="5328033"/>
-            <a:ext cx="1260000" cy="1620000"/>
-          </a:xfrm>
-          <a:prstGeom prst="rect">
-            <a:avLst/>
-          </a:prstGeom>
-          <a:solidFill>
-            <a:schemeClr val="accent2"/>
-          </a:solidFill>
-          <a:ln w="76200">
-            <a:solidFill>
-              <a:schemeClr val="bg1"/>
-            </a:solidFill>
-          </a:ln>
-        </p:spPr>
-        <p:style>
-          <a:lnRef idx="2">
-            <a:schemeClr val="accent1">
-              <a:shade val="50000"/>
-            </a:schemeClr>
-          </a:lnRef>
-          <a:fillRef idx="1">
-            <a:schemeClr val="accent1"/>
-          </a:fillRef>
-          <a:effectRef idx="0">
-            <a:schemeClr val="accent1"/>
-          </a:effectRef>
-          <a:fontRef idx="minor">
-            <a:schemeClr val="lt1"/>
-          </a:fontRef>
-        </p:style>
-        <p:txBody>
-          <a:bodyPr rtlCol="0" anchor="ctr"/>
-          <a:lstStyle/>
-          <a:p>
-            <a:pPr algn="ctr"/>
-            <a:endParaRPr lang="pt-BR"/>
-          </a:p>
-        </p:txBody>
-      </p:sp>
-      <p:sp>
-        <p:nvSpPr>
-          <p:cNvPr id="25" name="Retângulo 24"/>
-          <p:cNvSpPr/>
-          <p:nvPr/>
-        </p:nvSpPr>
-        <p:spPr>
-          <a:xfrm>
-            <a:off x="6439522" y="5328033"/>
-            <a:ext cx="1260000" cy="1620000"/>
-          </a:xfrm>
-          <a:prstGeom prst="rect">
-            <a:avLst/>
-          </a:prstGeom>
-          <a:solidFill>
-            <a:schemeClr val="accent2"/>
-          </a:solidFill>
-          <a:ln w="76200">
-            <a:solidFill>
-              <a:schemeClr val="bg1"/>
-            </a:solidFill>
-          </a:ln>
-        </p:spPr>
-        <p:style>
-          <a:lnRef idx="2">
-            <a:schemeClr val="accent1">
-              <a:shade val="50000"/>
-            </a:schemeClr>
-          </a:lnRef>
-          <a:fillRef idx="1">
-            <a:schemeClr val="accent1"/>
-          </a:fillRef>
-          <a:effectRef idx="0">
-            <a:schemeClr val="accent1"/>
-          </a:effectRef>
-          <a:fontRef idx="minor">
-            <a:schemeClr val="lt1"/>
-          </a:fontRef>
-        </p:style>
-        <p:txBody>
-          <a:bodyPr rtlCol="0" anchor="ctr"/>
-          <a:lstStyle/>
-          <a:p>
-            <a:pPr algn="ctr"/>
-            <a:endParaRPr lang="pt-BR"/>
-          </a:p>
-        </p:txBody>
-      </p:sp>
+            <a:ln w="76200">
+              <a:solidFill>
+                <a:schemeClr val="bg1"/>
+              </a:solidFill>
+            </a:ln>
+          </p:spPr>
+          <p:style>
+            <a:lnRef idx="2">
+              <a:schemeClr val="accent1">
+                <a:shade val="50000"/>
+              </a:schemeClr>
+            </a:lnRef>
+            <a:fillRef idx="1">
+              <a:schemeClr val="accent1"/>
+            </a:fillRef>
+            <a:effectRef idx="0">
+              <a:schemeClr val="accent1"/>
+            </a:effectRef>
+            <a:fontRef idx="minor">
+              <a:schemeClr val="lt1"/>
+            </a:fontRef>
+          </p:style>
+          <p:txBody>
+            <a:bodyPr rtlCol="0" anchor="ctr"/>
+            <a:lstStyle/>
+            <a:p>
+              <a:pPr algn="ctr"/>
+              <a:endParaRPr lang="pt-BR"/>
+            </a:p>
+          </p:txBody>
+        </p:sp>
+      </p:grpSp>
     </p:spTree>
     <p:extLst>
       <p:ext uri="{BB962C8B-B14F-4D97-AF65-F5344CB8AC3E}">

</xml_diff>